<commit_message>
getting the basics down
</commit_message>
<xml_diff>
--- a/Powercli/VMwareExplore_2024/CODE1744LV - PowerCLI 201 - From the Shell to Writing Scripts.pptx
+++ b/Powercli/VMwareExplore_2024/CODE1744LV - PowerCLI 201 - From the Shell to Writing Scripts.pptx
@@ -5,27 +5,34 @@
     <p:sldMasterId id="2147483937" r:id="rId4"/>
   </p:sldMasterIdLst>
   <p:notesMasterIdLst>
-    <p:notesMasterId r:id="rId15"/>
+    <p:notesMasterId r:id="rId22"/>
   </p:notesMasterIdLst>
   <p:handoutMasterIdLst>
-    <p:handoutMasterId r:id="rId16"/>
+    <p:handoutMasterId r:id="rId23"/>
   </p:handoutMasterIdLst>
   <p:sldIdLst>
     <p:sldId id="2147470580" r:id="rId5"/>
     <p:sldId id="2147470579" r:id="rId6"/>
     <p:sldId id="2147470581" r:id="rId7"/>
-    <p:sldId id="2147470577" r:id="rId8"/>
-    <p:sldId id="2147470582" r:id="rId9"/>
-    <p:sldId id="2147470578" r:id="rId10"/>
-    <p:sldId id="2147470583" r:id="rId11"/>
-    <p:sldId id="2026819541" r:id="rId12"/>
-    <p:sldId id="2026819542" r:id="rId13"/>
-    <p:sldId id="2026819543" r:id="rId14"/>
+    <p:sldId id="2147470582" r:id="rId8"/>
+    <p:sldId id="2147470583" r:id="rId9"/>
+    <p:sldId id="2147470593" r:id="rId10"/>
+    <p:sldId id="2147470578" r:id="rId11"/>
+    <p:sldId id="2147470584" r:id="rId12"/>
+    <p:sldId id="2147470585" r:id="rId13"/>
+    <p:sldId id="2147470586" r:id="rId14"/>
+    <p:sldId id="2147470587" r:id="rId15"/>
+    <p:sldId id="2147470589" r:id="rId16"/>
+    <p:sldId id="2147470590" r:id="rId17"/>
+    <p:sldId id="2147470591" r:id="rId18"/>
+    <p:sldId id="2147470592" r:id="rId19"/>
+    <p:sldId id="2026819541" r:id="rId20"/>
+    <p:sldId id="2026819543" r:id="rId21"/>
   </p:sldIdLst>
   <p:sldSz cx="12188825" cy="6858000"/>
   <p:notesSz cx="6858000" cy="9144000"/>
   <p:custDataLst>
-    <p:tags r:id="rId17"/>
+    <p:tags r:id="rId24"/>
   </p:custDataLst>
   <p:defaultTextStyle>
     <a:defPPr>
@@ -130,16 +137,23 @@
             <p14:sldId id="2147470580"/>
             <p14:sldId id="2147470579"/>
             <p14:sldId id="2147470581"/>
-            <p14:sldId id="2147470577"/>
           </p14:sldIdLst>
         </p14:section>
         <p14:section name="Template" id="{095074CF-EC36-8641-8A3E-A95BC79C523F}">
           <p14:sldIdLst>
             <p14:sldId id="2147470582"/>
+            <p14:sldId id="2147470583"/>
+            <p14:sldId id="2147470593"/>
             <p14:sldId id="2147470578"/>
-            <p14:sldId id="2147470583"/>
+            <p14:sldId id="2147470584"/>
+            <p14:sldId id="2147470585"/>
+            <p14:sldId id="2147470586"/>
+            <p14:sldId id="2147470587"/>
+            <p14:sldId id="2147470589"/>
+            <p14:sldId id="2147470590"/>
+            <p14:sldId id="2147470591"/>
+            <p14:sldId id="2147470592"/>
             <p14:sldId id="2026819541"/>
-            <p14:sldId id="2026819542"/>
             <p14:sldId id="2026819543"/>
           </p14:sldIdLst>
         </p14:section>
@@ -268,7 +282,7 @@
               <a:rPr lang="en-US" smtClean="0">
                 <a:latin typeface="Metropolis" panose="00000500000000000000" pitchFamily="50" charset="0"/>
               </a:rPr>
-              <a:t>6/19/2024</a:t>
+              <a:t>8/9/2024</a:t>
             </a:fld>
             <a:endParaRPr lang="en-US">
               <a:latin typeface="Metropolis" panose="00000500000000000000" pitchFamily="50" charset="0"/>
@@ -446,7 +460,7 @@
             <a:fld id="{3CB6F0DB-E055-41D0-9102-627A646E4242}" type="datetimeFigureOut">
               <a:rPr lang="en-US" smtClean="0"/>
               <a:pPr/>
-              <a:t>6/19/2024</a:t>
+              <a:t>8/9/2024</a:t>
             </a:fld>
             <a:endParaRPr lang="en-US"/>
           </a:p>
@@ -720,91 +734,6 @@
 </p:notesMaster>
 </file>
 
-<file path=ppt/notesSlides/notesSlide1.xml><?xml version="1.0" encoding="utf-8"?>
-<p:notes xmlns:a="http://schemas.openxmlformats.org/drawingml/2006/main" xmlns:r="http://schemas.openxmlformats.org/officeDocument/2006/relationships" xmlns:p="http://schemas.openxmlformats.org/presentationml/2006/main">
-  <p:cSld>
-    <p:spTree>
-      <p:nvGrpSpPr>
-        <p:cNvPr id="1" name=""/>
-        <p:cNvGrpSpPr/>
-        <p:nvPr/>
-      </p:nvGrpSpPr>
-      <p:grpSpPr>
-        <a:xfrm>
-          <a:off x="0" y="0"/>
-          <a:ext cx="0" cy="0"/>
-          <a:chOff x="0" y="0"/>
-          <a:chExt cx="0" cy="0"/>
-        </a:xfrm>
-      </p:grpSpPr>
-      <p:sp>
-        <p:nvSpPr>
-          <p:cNvPr id="2" name="Slide Image Placeholder 1"/>
-          <p:cNvSpPr>
-            <a:spLocks noGrp="1" noRot="1" noChangeAspect="1"/>
-          </p:cNvSpPr>
-          <p:nvPr>
-            <p:ph type="sldImg"/>
-          </p:nvPr>
-        </p:nvSpPr>
-        <p:spPr/>
-      </p:sp>
-      <p:sp>
-        <p:nvSpPr>
-          <p:cNvPr id="3" name="Notes Placeholder 2"/>
-          <p:cNvSpPr>
-            <a:spLocks noGrp="1"/>
-          </p:cNvSpPr>
-          <p:nvPr>
-            <p:ph type="body" idx="1"/>
-          </p:nvPr>
-        </p:nvSpPr>
-        <p:spPr/>
-        <p:txBody>
-          <a:bodyPr/>
-          <a:lstStyle/>
-          <a:p>
-            <a:endParaRPr lang="en-US" dirty="0"/>
-          </a:p>
-        </p:txBody>
-      </p:sp>
-      <p:sp>
-        <p:nvSpPr>
-          <p:cNvPr id="4" name="Slide Number Placeholder 3"/>
-          <p:cNvSpPr>
-            <a:spLocks noGrp="1"/>
-          </p:cNvSpPr>
-          <p:nvPr>
-            <p:ph type="sldNum" sz="quarter" idx="5"/>
-          </p:nvPr>
-        </p:nvSpPr>
-        <p:spPr/>
-        <p:txBody>
-          <a:bodyPr/>
-          <a:lstStyle/>
-          <a:p>
-            <a:fld id="{9F4FBC3A-A12C-40F9-BB8D-BC30C7901396}" type="slidenum">
-              <a:rPr lang="en-US" smtClean="0"/>
-              <a:pPr/>
-              <a:t>9</a:t>
-            </a:fld>
-            <a:endParaRPr lang="en-US" dirty="0"/>
-          </a:p>
-        </p:txBody>
-      </p:sp>
-    </p:spTree>
-    <p:extLst>
-      <p:ext uri="{BB962C8B-B14F-4D97-AF65-F5344CB8AC3E}">
-        <p14:creationId xmlns:p14="http://schemas.microsoft.com/office/powerpoint/2010/main" val="1656509301"/>
-      </p:ext>
-    </p:extLst>
-  </p:cSld>
-  <p:clrMapOvr>
-    <a:masterClrMapping/>
-  </p:clrMapOvr>
-</p:notes>
-</file>
-
 <file path=ppt/slideLayouts/slideLayout1.xml><?xml version="1.0" encoding="utf-8"?>
 <p:sldLayout xmlns:a="http://schemas.openxmlformats.org/drawingml/2006/main" xmlns:r="http://schemas.openxmlformats.org/officeDocument/2006/relationships" xmlns:p="http://schemas.openxmlformats.org/presentationml/2006/main" showMasterSp="0" preserve="1" userDrawn="1">
   <p:cSld name="Title Slide">
@@ -944,7 +873,7 @@
           <a:blip r:embed="rId3">
             <a:extLst>
               <a:ext uri="{96DAC541-7B7A-43D3-8B79-37D633B846F1}">
-                <asvg:svgBlip xmlns:asvg="http://schemas.microsoft.com/office/drawing/2016/SVG/main" xmlns="" r:embed="rId4"/>
+                <asvg:svgBlip xmlns="" xmlns:asvg="http://schemas.microsoft.com/office/drawing/2016/SVG/main" r:embed="rId4"/>
               </a:ext>
             </a:extLst>
           </a:blip>
@@ -1507,7 +1436,7 @@
                 <a16:creationId xmlns:a16="http://schemas.microsoft.com/office/drawing/2014/main" id="{AA1B5F83-A93D-544C-8DB4-B164DBF2F72D}"/>
               </a:ext>
               <a:ext uri="{C183D7F6-B498-43B3-948B-1728B52AA6E4}">
-                <adec:decorative xmlns:adec="http://schemas.microsoft.com/office/drawing/2017/decorative" xmlns="" val="1"/>
+                <adec:decorative xmlns="" xmlns:adec="http://schemas.microsoft.com/office/drawing/2017/decorative" val="1"/>
               </a:ext>
             </a:extLst>
           </p:cNvPr>
@@ -1719,7 +1648,7 @@
                 <a16:creationId xmlns:a16="http://schemas.microsoft.com/office/drawing/2014/main" id="{417D4F8B-2025-D14C-A41E-9C0B401DE6B0}"/>
               </a:ext>
               <a:ext uri="{C183D7F6-B498-43B3-948B-1728B52AA6E4}">
-                <adec:decorative xmlns:adec="http://schemas.microsoft.com/office/drawing/2017/decorative" xmlns="" val="1"/>
+                <adec:decorative xmlns="" xmlns:adec="http://schemas.microsoft.com/office/drawing/2017/decorative" val="1"/>
               </a:ext>
             </a:extLst>
           </p:cNvPr>
@@ -2185,7 +2114,7 @@
                 <a16:creationId xmlns:a16="http://schemas.microsoft.com/office/drawing/2014/main" id="{B164666E-28C9-844E-91D8-ECA2F1E57595}"/>
               </a:ext>
               <a:ext uri="{C183D7F6-B498-43B3-948B-1728B52AA6E4}">
-                <adec:decorative xmlns:adec="http://schemas.microsoft.com/office/drawing/2017/decorative" xmlns="" val="1"/>
+                <adec:decorative xmlns="" xmlns:adec="http://schemas.microsoft.com/office/drawing/2017/decorative" val="1"/>
               </a:ext>
             </a:extLst>
           </p:cNvPr>
@@ -2398,7 +2327,7 @@
                 <a16:creationId xmlns:a16="http://schemas.microsoft.com/office/drawing/2014/main" id="{97B963A1-3810-7A40-8918-6D6D68B4A836}"/>
               </a:ext>
               <a:ext uri="{C183D7F6-B498-43B3-948B-1728B52AA6E4}">
-                <adec:decorative xmlns:adec="http://schemas.microsoft.com/office/drawing/2017/decorative" xmlns="" val="1"/>
+                <adec:decorative xmlns="" xmlns:adec="http://schemas.microsoft.com/office/drawing/2017/decorative" val="1"/>
               </a:ext>
             </a:extLst>
           </p:cNvPr>
@@ -2520,7 +2449,7 @@
                 <a16:creationId xmlns:a16="http://schemas.microsoft.com/office/drawing/2014/main" id="{E17DA4B3-27AC-8A64-FD5E-59AEAE0D8559}"/>
               </a:ext>
               <a:ext uri="{C183D7F6-B498-43B3-948B-1728B52AA6E4}">
-                <adec:decorative xmlns:adec="http://schemas.microsoft.com/office/drawing/2017/decorative" xmlns="" val="1"/>
+                <adec:decorative xmlns="" xmlns:adec="http://schemas.microsoft.com/office/drawing/2017/decorative" val="1"/>
               </a:ext>
             </a:extLst>
           </p:cNvPr>
@@ -3040,7 +2969,7 @@
                 <a16:creationId xmlns:a16="http://schemas.microsoft.com/office/drawing/2014/main" id="{D864AC6E-1611-244C-BA28-696924BAB259}"/>
               </a:ext>
               <a:ext uri="{C183D7F6-B498-43B3-948B-1728B52AA6E4}">
-                <adec:decorative xmlns:adec="http://schemas.microsoft.com/office/drawing/2017/decorative" xmlns="" val="1"/>
+                <adec:decorative xmlns="" xmlns:adec="http://schemas.microsoft.com/office/drawing/2017/decorative" val="1"/>
               </a:ext>
             </a:extLst>
           </p:cNvPr>
@@ -3653,7 +3582,7 @@
                 <a16:creationId xmlns:a16="http://schemas.microsoft.com/office/drawing/2014/main" id="{85B60DB8-F067-969E-72B5-4E90025E5BF8}"/>
               </a:ext>
               <a:ext uri="{C183D7F6-B498-43B3-948B-1728B52AA6E4}">
-                <adec:decorative xmlns:adec="http://schemas.microsoft.com/office/drawing/2017/decorative" xmlns="" val="1"/>
+                <adec:decorative xmlns="" xmlns:adec="http://schemas.microsoft.com/office/drawing/2017/decorative" val="1"/>
               </a:ext>
             </a:extLst>
           </p:cNvPr>
@@ -4156,7 +4085,7 @@
                 <a16:creationId xmlns:a16="http://schemas.microsoft.com/office/drawing/2014/main" id="{F7E2C737-3A4D-924A-88B5-FA4D5C8A07C7}"/>
               </a:ext>
               <a:ext uri="{C183D7F6-B498-43B3-948B-1728B52AA6E4}">
-                <adec:decorative xmlns:adec="http://schemas.microsoft.com/office/drawing/2017/decorative" xmlns="" val="1"/>
+                <adec:decorative xmlns="" xmlns:adec="http://schemas.microsoft.com/office/drawing/2017/decorative" val="1"/>
               </a:ext>
             </a:extLst>
           </p:cNvPr>
@@ -4754,7 +4683,7 @@
                 <a16:creationId xmlns:a16="http://schemas.microsoft.com/office/drawing/2014/main" id="{56D4D92B-574E-4F63-A5BA-8F7282B54C27}"/>
               </a:ext>
               <a:ext uri="{C183D7F6-B498-43B3-948B-1728B52AA6E4}">
-                <adec:decorative xmlns:adec="http://schemas.microsoft.com/office/drawing/2017/decorative" xmlns="" val="1"/>
+                <adec:decorative xmlns="" xmlns:adec="http://schemas.microsoft.com/office/drawing/2017/decorative" val="1"/>
               </a:ext>
             </a:extLst>
           </p:cNvPr>
@@ -4918,7 +4847,7 @@
                 <a16:creationId xmlns:a16="http://schemas.microsoft.com/office/drawing/2014/main" id="{F789B473-DDE6-4450-A111-3761F341AAE3}"/>
               </a:ext>
               <a:ext uri="{C183D7F6-B498-43B3-948B-1728B52AA6E4}">
-                <adec:decorative xmlns:adec="http://schemas.microsoft.com/office/drawing/2017/decorative" xmlns="" val="1"/>
+                <adec:decorative xmlns="" xmlns:adec="http://schemas.microsoft.com/office/drawing/2017/decorative" val="1"/>
               </a:ext>
             </a:extLst>
           </p:cNvPr>
@@ -5428,7 +5357,7 @@
                 <a16:creationId xmlns:a16="http://schemas.microsoft.com/office/drawing/2014/main" id="{14F46384-B6E3-0D43-924E-874DEC2344B1}"/>
               </a:ext>
               <a:ext uri="{C183D7F6-B498-43B3-948B-1728B52AA6E4}">
-                <adec:decorative xmlns:adec="http://schemas.microsoft.com/office/drawing/2017/decorative" xmlns="" val="1"/>
+                <adec:decorative xmlns="" xmlns:adec="http://schemas.microsoft.com/office/drawing/2017/decorative" val="1"/>
               </a:ext>
             </a:extLst>
           </p:cNvPr>
@@ -5575,7 +5504,7 @@
                 <a16:creationId xmlns:a16="http://schemas.microsoft.com/office/drawing/2014/main" id="{33526770-8F35-FB4A-8638-521D0DA87F6C}"/>
               </a:ext>
               <a:ext uri="{C183D7F6-B498-43B3-948B-1728B52AA6E4}">
-                <adec:decorative xmlns:adec="http://schemas.microsoft.com/office/drawing/2017/decorative" xmlns="" val="1"/>
+                <adec:decorative xmlns="" xmlns:adec="http://schemas.microsoft.com/office/drawing/2017/decorative" val="1"/>
               </a:ext>
             </a:extLst>
           </p:cNvPr>
@@ -5722,7 +5651,7 @@
                 <a16:creationId xmlns:a16="http://schemas.microsoft.com/office/drawing/2014/main" id="{73C08A52-2522-8C40-B8B1-C98FEBB888F7}"/>
               </a:ext>
               <a:ext uri="{C183D7F6-B498-43B3-948B-1728B52AA6E4}">
-                <adec:decorative xmlns:adec="http://schemas.microsoft.com/office/drawing/2017/decorative" xmlns="" val="1"/>
+                <adec:decorative xmlns="" xmlns:adec="http://schemas.microsoft.com/office/drawing/2017/decorative" val="1"/>
               </a:ext>
             </a:extLst>
           </p:cNvPr>
@@ -5869,7 +5798,7 @@
                 <a16:creationId xmlns:a16="http://schemas.microsoft.com/office/drawing/2014/main" id="{9B57CCC6-06B1-7342-99B0-BC7C8FBE5E73}"/>
               </a:ext>
               <a:ext uri="{C183D7F6-B498-43B3-948B-1728B52AA6E4}">
-                <adec:decorative xmlns:adec="http://schemas.microsoft.com/office/drawing/2017/decorative" xmlns="" val="1"/>
+                <adec:decorative xmlns="" xmlns:adec="http://schemas.microsoft.com/office/drawing/2017/decorative" val="1"/>
               </a:ext>
             </a:extLst>
           </p:cNvPr>
@@ -6016,7 +5945,7 @@
                 <a16:creationId xmlns:a16="http://schemas.microsoft.com/office/drawing/2014/main" id="{23C87E7C-5ED2-214E-8A38-ED05177A65DC}"/>
               </a:ext>
               <a:ext uri="{C183D7F6-B498-43B3-948B-1728B52AA6E4}">
-                <adec:decorative xmlns:adec="http://schemas.microsoft.com/office/drawing/2017/decorative" xmlns="" val="1"/>
+                <adec:decorative xmlns="" xmlns:adec="http://schemas.microsoft.com/office/drawing/2017/decorative" val="1"/>
               </a:ext>
             </a:extLst>
           </p:cNvPr>
@@ -6785,7 +6714,7 @@
                 <a16:creationId xmlns:a16="http://schemas.microsoft.com/office/drawing/2014/main" id="{5CABBF0D-1BD1-F9E7-64FF-6B8D87E611B7}"/>
               </a:ext>
               <a:ext uri="{C183D7F6-B498-43B3-948B-1728B52AA6E4}">
-                <adec:decorative xmlns:adec="http://schemas.microsoft.com/office/drawing/2017/decorative" xmlns="" val="1"/>
+                <adec:decorative xmlns="" xmlns:adec="http://schemas.microsoft.com/office/drawing/2017/decorative" val="1"/>
               </a:ext>
             </a:extLst>
           </p:cNvPr>
@@ -7245,7 +7174,7 @@
                 <a16:creationId xmlns:a16="http://schemas.microsoft.com/office/drawing/2014/main" id="{B1C210DC-5DBB-4F0D-875F-CD8AAAB938CE}"/>
               </a:ext>
               <a:ext uri="{C183D7F6-B498-43B3-948B-1728B52AA6E4}">
-                <adec:decorative xmlns:adec="http://schemas.microsoft.com/office/drawing/2017/decorative" xmlns="" val="1"/>
+                <adec:decorative xmlns="" xmlns:adec="http://schemas.microsoft.com/office/drawing/2017/decorative" val="1"/>
               </a:ext>
             </a:extLst>
           </p:cNvPr>
@@ -7444,7 +7373,7 @@
                 <a16:creationId xmlns:a16="http://schemas.microsoft.com/office/drawing/2014/main" id="{6FECF9D0-D7A8-43DD-B38D-E1090C0B322F}"/>
               </a:ext>
               <a:ext uri="{C183D7F6-B498-43B3-948B-1728B52AA6E4}">
-                <adec:decorative xmlns:adec="http://schemas.microsoft.com/office/drawing/2017/decorative" xmlns="" val="1"/>
+                <adec:decorative xmlns="" xmlns:adec="http://schemas.microsoft.com/office/drawing/2017/decorative" val="1"/>
               </a:ext>
             </a:extLst>
           </p:cNvPr>
@@ -7657,7 +7586,7 @@
                 <a16:creationId xmlns:a16="http://schemas.microsoft.com/office/drawing/2014/main" id="{446F04B0-7860-407F-85B7-42E38FAFE34B}"/>
               </a:ext>
               <a:ext uri="{C183D7F6-B498-43B3-948B-1728B52AA6E4}">
-                <adec:decorative xmlns:adec="http://schemas.microsoft.com/office/drawing/2017/decorative" xmlns="" val="1"/>
+                <adec:decorative xmlns="" xmlns:adec="http://schemas.microsoft.com/office/drawing/2017/decorative" val="1"/>
               </a:ext>
             </a:extLst>
           </p:cNvPr>
@@ -8084,7 +8013,7 @@
                 <a16:creationId xmlns:a16="http://schemas.microsoft.com/office/drawing/2014/main" id="{085441A7-EBA5-4ABB-8D29-CE4338F0F9B5}"/>
               </a:ext>
               <a:ext uri="{C183D7F6-B498-43B3-948B-1728B52AA6E4}">
-                <adec:decorative xmlns:adec="http://schemas.microsoft.com/office/drawing/2017/decorative" xmlns="" val="1"/>
+                <adec:decorative xmlns="" xmlns:adec="http://schemas.microsoft.com/office/drawing/2017/decorative" val="1"/>
               </a:ext>
             </a:extLst>
           </p:cNvPr>
@@ -8301,7 +8230,7 @@
                 <a16:creationId xmlns:a16="http://schemas.microsoft.com/office/drawing/2014/main" id="{45D908EF-1F96-4808-A8DB-F55AB9E8E436}"/>
               </a:ext>
               <a:ext uri="{C183D7F6-B498-43B3-948B-1728B52AA6E4}">
-                <adec:decorative xmlns:adec="http://schemas.microsoft.com/office/drawing/2017/decorative" xmlns="" val="1"/>
+                <adec:decorative xmlns="" xmlns:adec="http://schemas.microsoft.com/office/drawing/2017/decorative" val="1"/>
               </a:ext>
             </a:extLst>
           </p:cNvPr>
@@ -8514,7 +8443,7 @@
                 <a16:creationId xmlns:a16="http://schemas.microsoft.com/office/drawing/2014/main" id="{5670C03F-6336-45E3-A9F4-0CD130D80D1B}"/>
               </a:ext>
               <a:ext uri="{C183D7F6-B498-43B3-948B-1728B52AA6E4}">
-                <adec:decorative xmlns:adec="http://schemas.microsoft.com/office/drawing/2017/decorative" xmlns="" val="1"/>
+                <adec:decorative xmlns="" xmlns:adec="http://schemas.microsoft.com/office/drawing/2017/decorative" val="1"/>
               </a:ext>
             </a:extLst>
           </p:cNvPr>
@@ -8727,7 +8656,7 @@
                 <a16:creationId xmlns:a16="http://schemas.microsoft.com/office/drawing/2014/main" id="{3019BB56-AE7C-42CA-A8FF-432F4F176B8B}"/>
               </a:ext>
               <a:ext uri="{C183D7F6-B498-43B3-948B-1728B52AA6E4}">
-                <adec:decorative xmlns:adec="http://schemas.microsoft.com/office/drawing/2017/decorative" xmlns="" val="1"/>
+                <adec:decorative xmlns="" xmlns:adec="http://schemas.microsoft.com/office/drawing/2017/decorative" val="1"/>
               </a:ext>
             </a:extLst>
           </p:cNvPr>
@@ -9154,7 +9083,7 @@
                 <a16:creationId xmlns:a16="http://schemas.microsoft.com/office/drawing/2014/main" id="{A1FDF9D3-5B68-4A75-97BF-2C5113CFAA66}"/>
               </a:ext>
               <a:ext uri="{C183D7F6-B498-43B3-948B-1728B52AA6E4}">
-                <adec:decorative xmlns:adec="http://schemas.microsoft.com/office/drawing/2017/decorative" xmlns="" val="1"/>
+                <adec:decorative xmlns="" xmlns:adec="http://schemas.microsoft.com/office/drawing/2017/decorative" val="1"/>
               </a:ext>
             </a:extLst>
           </p:cNvPr>
@@ -9353,7 +9282,7 @@
                 <a16:creationId xmlns:a16="http://schemas.microsoft.com/office/drawing/2014/main" id="{C551C90A-573F-4E4A-9359-5C7B0F546BF9}"/>
               </a:ext>
               <a:ext uri="{C183D7F6-B498-43B3-948B-1728B52AA6E4}">
-                <adec:decorative xmlns:adec="http://schemas.microsoft.com/office/drawing/2017/decorative" xmlns="" val="1"/>
+                <adec:decorative xmlns="" xmlns:adec="http://schemas.microsoft.com/office/drawing/2017/decorative" val="1"/>
               </a:ext>
             </a:extLst>
           </p:cNvPr>
@@ -9555,7 +9484,7 @@
                 <a16:creationId xmlns:a16="http://schemas.microsoft.com/office/drawing/2014/main" id="{AF79E162-3D8F-4829-A4AD-02A03597B11A}"/>
               </a:ext>
               <a:ext uri="{C183D7F6-B498-43B3-948B-1728B52AA6E4}">
-                <adec:decorative xmlns:adec="http://schemas.microsoft.com/office/drawing/2017/decorative" xmlns="" val="1"/>
+                <adec:decorative xmlns="" xmlns:adec="http://schemas.microsoft.com/office/drawing/2017/decorative" val="1"/>
               </a:ext>
             </a:extLst>
           </p:cNvPr>
@@ -9768,7 +9697,7 @@
                 <a16:creationId xmlns:a16="http://schemas.microsoft.com/office/drawing/2014/main" id="{026B9B36-08E7-4664-970C-13123F24C793}"/>
               </a:ext>
               <a:ext uri="{C183D7F6-B498-43B3-948B-1728B52AA6E4}">
-                <adec:decorative xmlns:adec="http://schemas.microsoft.com/office/drawing/2017/decorative" xmlns="" val="1"/>
+                <adec:decorative xmlns="" xmlns:adec="http://schemas.microsoft.com/office/drawing/2017/decorative" val="1"/>
               </a:ext>
             </a:extLst>
           </p:cNvPr>
@@ -9985,7 +9914,7 @@
                 <a16:creationId xmlns:a16="http://schemas.microsoft.com/office/drawing/2014/main" id="{7EAB1992-E472-4489-8A4E-A8FE45DE10CF}"/>
               </a:ext>
               <a:ext uri="{C183D7F6-B498-43B3-948B-1728B52AA6E4}">
-                <adec:decorative xmlns:adec="http://schemas.microsoft.com/office/drawing/2017/decorative" xmlns="" val="1"/>
+                <adec:decorative xmlns="" xmlns:adec="http://schemas.microsoft.com/office/drawing/2017/decorative" val="1"/>
               </a:ext>
             </a:extLst>
           </p:cNvPr>
@@ -10559,7 +10488,7 @@
           <a:blip r:embed="rId3">
             <a:extLst>
               <a:ext uri="{96DAC541-7B7A-43D3-8B79-37D633B846F1}">
-                <asvg:svgBlip xmlns:asvg="http://schemas.microsoft.com/office/drawing/2016/SVG/main" xmlns="" r:embed="rId4"/>
+                <asvg:svgBlip xmlns="" xmlns:asvg="http://schemas.microsoft.com/office/drawing/2016/SVG/main" r:embed="rId4"/>
               </a:ext>
             </a:extLst>
           </a:blip>
@@ -10744,7 +10673,7 @@
           <a:blip r:embed="rId3">
             <a:extLst>
               <a:ext uri="{96DAC541-7B7A-43D3-8B79-37D633B846F1}">
-                <asvg:svgBlip xmlns:asvg="http://schemas.microsoft.com/office/drawing/2016/SVG/main" xmlns="" r:embed="rId4"/>
+                <asvg:svgBlip xmlns="" xmlns:asvg="http://schemas.microsoft.com/office/drawing/2016/SVG/main" r:embed="rId4"/>
               </a:ext>
             </a:extLst>
           </a:blip>
@@ -11006,7 +10935,7 @@
           <a:blip r:embed="rId2">
             <a:extLst>
               <a:ext uri="{96DAC541-7B7A-43D3-8B79-37D633B846F1}">
-                <asvg:svgBlip xmlns:asvg="http://schemas.microsoft.com/office/drawing/2016/SVG/main" xmlns="" r:embed="rId3"/>
+                <asvg:svgBlip xmlns="" xmlns:asvg="http://schemas.microsoft.com/office/drawing/2016/SVG/main" r:embed="rId3"/>
               </a:ext>
             </a:extLst>
           </a:blip>
@@ -11259,7 +11188,7 @@
                 <a16:creationId xmlns:a16="http://schemas.microsoft.com/office/drawing/2014/main" id="{B59E37DB-3217-4772-AE8E-E9673A139975}"/>
               </a:ext>
               <a:ext uri="{C183D7F6-B498-43B3-948B-1728B52AA6E4}">
-                <adec:decorative xmlns:adec="http://schemas.microsoft.com/office/drawing/2017/decorative" xmlns="" val="1"/>
+                <adec:decorative xmlns="" xmlns:adec="http://schemas.microsoft.com/office/drawing/2017/decorative" val="1"/>
               </a:ext>
             </a:extLst>
           </p:cNvPr>
@@ -11308,7 +11237,7 @@
                 <a16:creationId xmlns:a16="http://schemas.microsoft.com/office/drawing/2014/main" id="{F0DFE264-D676-EA48-BBA7-F4F0331FA268}"/>
               </a:ext>
               <a:ext uri="{C183D7F6-B498-43B3-948B-1728B52AA6E4}">
-                <adec:decorative xmlns:adec="http://schemas.microsoft.com/office/drawing/2017/decorative" xmlns="" val="1"/>
+                <adec:decorative xmlns="" xmlns:adec="http://schemas.microsoft.com/office/drawing/2017/decorative" val="1"/>
               </a:ext>
             </a:extLst>
           </p:cNvPr>
@@ -11411,7 +11340,7 @@
                 <a16:creationId xmlns:a16="http://schemas.microsoft.com/office/drawing/2014/main" id="{A0BB7D6E-2488-A644-A910-415B17221FBC}"/>
               </a:ext>
               <a:ext uri="{C183D7F6-B498-43B3-948B-1728B52AA6E4}">
-                <adec:decorative xmlns:adec="http://schemas.microsoft.com/office/drawing/2017/decorative" xmlns="" val="1"/>
+                <adec:decorative xmlns="" xmlns:adec="http://schemas.microsoft.com/office/drawing/2017/decorative" val="1"/>
               </a:ext>
             </a:extLst>
           </p:cNvPr>
@@ -16360,7 +16289,7 @@
           <a:blip r:embed="rId2">
             <a:extLst>
               <a:ext uri="{96DAC541-7B7A-43D3-8B79-37D633B846F1}">
-                <asvg:svgBlip xmlns:asvg="http://schemas.microsoft.com/office/drawing/2016/SVG/main" xmlns="" r:embed="rId3"/>
+                <asvg:svgBlip xmlns="" xmlns:asvg="http://schemas.microsoft.com/office/drawing/2016/SVG/main" r:embed="rId3"/>
               </a:ext>
             </a:extLst>
           </a:blip>
@@ -18919,7 +18848,7 @@
           <a:blip r:embed="rId28">
             <a:extLst>
               <a:ext uri="{96DAC541-7B7A-43D3-8B79-37D633B846F1}">
-                <asvg:svgBlip xmlns:asvg="http://schemas.microsoft.com/office/drawing/2016/SVG/main" xmlns="" r:embed="rId29"/>
+                <asvg:svgBlip xmlns="" xmlns:asvg="http://schemas.microsoft.com/office/drawing/2016/SVG/main" r:embed="rId29"/>
               </a:ext>
             </a:extLst>
           </a:blip>
@@ -20388,6 +20317,875 @@
           <p:cNvPr id="2" name="Title 1">
             <a:extLst>
               <a:ext uri="{FF2B5EF4-FFF2-40B4-BE49-F238E27FC236}">
+                <a16:creationId xmlns:a16="http://schemas.microsoft.com/office/drawing/2014/main" id="{0D9FDAE6-550E-E975-BD01-08906590C472}"/>
+              </a:ext>
+            </a:extLst>
+          </p:cNvPr>
+          <p:cNvSpPr>
+            <a:spLocks noGrp="1"/>
+          </p:cNvSpPr>
+          <p:nvPr>
+            <p:ph type="title"/>
+          </p:nvPr>
+        </p:nvSpPr>
+        <p:spPr/>
+        <p:txBody>
+          <a:bodyPr/>
+          <a:lstStyle/>
+          <a:p>
+            <a:r>
+              <a:rPr lang="en-US" dirty="0" smtClean="0"/>
+              <a:t>PowerShell vs. C# vs. </a:t>
+            </a:r>
+            <a:r>
+              <a:rPr lang="en-US" dirty="0" err="1" smtClean="0"/>
+              <a:t>.Net</a:t>
+            </a:r>
+            <a:endParaRPr lang="en-US" dirty="0"/>
+          </a:p>
+        </p:txBody>
+      </p:sp>
+      <p:sp>
+        <p:nvSpPr>
+          <p:cNvPr id="5" name="Content Placeholder 4">
+            <a:extLst>
+              <a:ext uri="{FF2B5EF4-FFF2-40B4-BE49-F238E27FC236}">
+                <a16:creationId xmlns:a16="http://schemas.microsoft.com/office/drawing/2014/main" id="{8FBEB278-6650-3A11-7DCD-A90016572E5A}"/>
+              </a:ext>
+            </a:extLst>
+          </p:cNvPr>
+          <p:cNvSpPr>
+            <a:spLocks noGrp="1"/>
+          </p:cNvSpPr>
+          <p:nvPr>
+            <p:ph sz="quarter" idx="14"/>
+          </p:nvPr>
+        </p:nvSpPr>
+        <p:spPr/>
+        <p:txBody>
+          <a:bodyPr/>
+          <a:lstStyle/>
+          <a:p>
+            <a:pPr marL="342900" indent="-342900"/>
+            <a:r>
+              <a:rPr lang="en-US" dirty="0" smtClean="0"/>
+              <a:t>PowerShell vs. C# (See Sharp) vs. </a:t>
+            </a:r>
+            <a:r>
+              <a:rPr lang="en-US" dirty="0" err="1" smtClean="0"/>
+              <a:t>.net</a:t>
+            </a:r>
+            <a:r>
+              <a:rPr lang="en-US" dirty="0" smtClean="0"/>
+              <a:t> (Dot Net)</a:t>
+            </a:r>
+          </a:p>
+          <a:p>
+            <a:pPr marL="342900" indent="-342900"/>
+            <a:endParaRPr lang="en-US" dirty="0" smtClean="0"/>
+          </a:p>
+          <a:p>
+            <a:pPr marL="342900" indent="-342900"/>
+            <a:endParaRPr lang="en-US" dirty="0"/>
+          </a:p>
+        </p:txBody>
+      </p:sp>
+    </p:spTree>
+    <p:extLst>
+      <p:ext uri="{BB962C8B-B14F-4D97-AF65-F5344CB8AC3E}">
+        <p14:creationId xmlns:p14="http://schemas.microsoft.com/office/powerpoint/2010/main" val="3865169922"/>
+      </p:ext>
+    </p:extLst>
+  </p:cSld>
+  <p:clrMapOvr>
+    <a:masterClrMapping/>
+  </p:clrMapOvr>
+  <mc:AlternateContent xmlns:mc="http://schemas.openxmlformats.org/markup-compatibility/2006" xmlns:p14="http://schemas.microsoft.com/office/powerpoint/2010/main">
+    <mc:Choice Requires="p14">
+      <p:transition spd="med" p14:dur="700">
+        <p:fade/>
+      </p:transition>
+    </mc:Choice>
+    <mc:Fallback xmlns="">
+      <p:transition spd="med">
+        <p:fade/>
+      </p:transition>
+    </mc:Fallback>
+  </mc:AlternateContent>
+</p:sld>
+</file>
+
+<file path=ppt/slides/slide11.xml><?xml version="1.0" encoding="utf-8"?>
+<p:sld xmlns:a="http://schemas.openxmlformats.org/drawingml/2006/main" xmlns:r="http://schemas.openxmlformats.org/officeDocument/2006/relationships" xmlns:p="http://schemas.openxmlformats.org/presentationml/2006/main">
+  <p:cSld>
+    <p:spTree>
+      <p:nvGrpSpPr>
+        <p:cNvPr id="1" name=""/>
+        <p:cNvGrpSpPr/>
+        <p:nvPr/>
+      </p:nvGrpSpPr>
+      <p:grpSpPr>
+        <a:xfrm>
+          <a:off x="0" y="0"/>
+          <a:ext cx="0" cy="0"/>
+          <a:chOff x="0" y="0"/>
+          <a:chExt cx="0" cy="0"/>
+        </a:xfrm>
+      </p:grpSpPr>
+      <p:sp>
+        <p:nvSpPr>
+          <p:cNvPr id="2" name="Title 1">
+            <a:extLst>
+              <a:ext uri="{FF2B5EF4-FFF2-40B4-BE49-F238E27FC236}">
+                <a16:creationId xmlns:a16="http://schemas.microsoft.com/office/drawing/2014/main" id="{0D9FDAE6-550E-E975-BD01-08906590C472}"/>
+              </a:ext>
+            </a:extLst>
+          </p:cNvPr>
+          <p:cNvSpPr>
+            <a:spLocks noGrp="1"/>
+          </p:cNvSpPr>
+          <p:nvPr>
+            <p:ph type="title"/>
+          </p:nvPr>
+        </p:nvSpPr>
+        <p:spPr/>
+        <p:txBody>
+          <a:bodyPr/>
+          <a:lstStyle/>
+          <a:p>
+            <a:r>
+              <a:rPr lang="en-US" dirty="0" smtClean="0"/>
+              <a:t>Converting Developer Center Output to useable PowerShell/</a:t>
+            </a:r>
+            <a:r>
+              <a:rPr lang="en-US" dirty="0" err="1" smtClean="0"/>
+              <a:t>PowerCLI</a:t>
+            </a:r>
+            <a:endParaRPr lang="en-US" dirty="0"/>
+          </a:p>
+        </p:txBody>
+      </p:sp>
+      <p:sp>
+        <p:nvSpPr>
+          <p:cNvPr id="5" name="Content Placeholder 4">
+            <a:extLst>
+              <a:ext uri="{FF2B5EF4-FFF2-40B4-BE49-F238E27FC236}">
+                <a16:creationId xmlns:a16="http://schemas.microsoft.com/office/drawing/2014/main" id="{8FBEB278-6650-3A11-7DCD-A90016572E5A}"/>
+              </a:ext>
+            </a:extLst>
+          </p:cNvPr>
+          <p:cNvSpPr>
+            <a:spLocks noGrp="1"/>
+          </p:cNvSpPr>
+          <p:nvPr>
+            <p:ph sz="quarter" idx="14"/>
+          </p:nvPr>
+        </p:nvSpPr>
+        <p:spPr/>
+        <p:txBody>
+          <a:bodyPr/>
+          <a:lstStyle/>
+          <a:p>
+            <a:pPr marL="342900" indent="-342900"/>
+            <a:endParaRPr lang="en-US" dirty="0" smtClean="0"/>
+          </a:p>
+          <a:p>
+            <a:pPr marL="342900" indent="-342900"/>
+            <a:endParaRPr lang="en-US" dirty="0"/>
+          </a:p>
+        </p:txBody>
+      </p:sp>
+    </p:spTree>
+    <p:extLst>
+      <p:ext uri="{BB962C8B-B14F-4D97-AF65-F5344CB8AC3E}">
+        <p14:creationId xmlns:p14="http://schemas.microsoft.com/office/powerpoint/2010/main" val="4093665524"/>
+      </p:ext>
+    </p:extLst>
+  </p:cSld>
+  <p:clrMapOvr>
+    <a:masterClrMapping/>
+  </p:clrMapOvr>
+  <mc:AlternateContent xmlns:mc="http://schemas.openxmlformats.org/markup-compatibility/2006" xmlns:p14="http://schemas.microsoft.com/office/powerpoint/2010/main">
+    <mc:Choice Requires="p14">
+      <p:transition spd="med" p14:dur="700">
+        <p:fade/>
+      </p:transition>
+    </mc:Choice>
+    <mc:Fallback xmlns="">
+      <p:transition spd="med">
+        <p:fade/>
+      </p:transition>
+    </mc:Fallback>
+  </mc:AlternateContent>
+</p:sld>
+</file>
+
+<file path=ppt/slides/slide12.xml><?xml version="1.0" encoding="utf-8"?>
+<p:sld xmlns:a="http://schemas.openxmlformats.org/drawingml/2006/main" xmlns:r="http://schemas.openxmlformats.org/officeDocument/2006/relationships" xmlns:p="http://schemas.openxmlformats.org/presentationml/2006/main">
+  <p:cSld>
+    <p:spTree>
+      <p:nvGrpSpPr>
+        <p:cNvPr id="1" name=""/>
+        <p:cNvGrpSpPr/>
+        <p:nvPr/>
+      </p:nvGrpSpPr>
+      <p:grpSpPr>
+        <a:xfrm>
+          <a:off x="0" y="0"/>
+          <a:ext cx="0" cy="0"/>
+          <a:chOff x="0" y="0"/>
+          <a:chExt cx="0" cy="0"/>
+        </a:xfrm>
+      </p:grpSpPr>
+      <p:sp>
+        <p:nvSpPr>
+          <p:cNvPr id="2" name="Title 1">
+            <a:extLst>
+              <a:ext uri="{FF2B5EF4-FFF2-40B4-BE49-F238E27FC236}">
+                <a16:creationId xmlns:a16="http://schemas.microsoft.com/office/drawing/2014/main" id="{0D9FDAE6-550E-E975-BD01-08906590C472}"/>
+              </a:ext>
+            </a:extLst>
+          </p:cNvPr>
+          <p:cNvSpPr>
+            <a:spLocks noGrp="1"/>
+          </p:cNvSpPr>
+          <p:nvPr>
+            <p:ph type="title"/>
+          </p:nvPr>
+        </p:nvSpPr>
+        <p:spPr/>
+        <p:txBody>
+          <a:bodyPr/>
+          <a:lstStyle/>
+          <a:p>
+            <a:r>
+              <a:rPr lang="en-US" dirty="0" smtClean="0"/>
+              <a:t>Get-Help</a:t>
+            </a:r>
+            <a:endParaRPr lang="en-US" dirty="0"/>
+          </a:p>
+        </p:txBody>
+      </p:sp>
+      <p:sp>
+        <p:nvSpPr>
+          <p:cNvPr id="5" name="Content Placeholder 4">
+            <a:extLst>
+              <a:ext uri="{FF2B5EF4-FFF2-40B4-BE49-F238E27FC236}">
+                <a16:creationId xmlns:a16="http://schemas.microsoft.com/office/drawing/2014/main" id="{8FBEB278-6650-3A11-7DCD-A90016572E5A}"/>
+              </a:ext>
+            </a:extLst>
+          </p:cNvPr>
+          <p:cNvSpPr>
+            <a:spLocks noGrp="1"/>
+          </p:cNvSpPr>
+          <p:nvPr>
+            <p:ph sz="quarter" idx="14"/>
+          </p:nvPr>
+        </p:nvSpPr>
+        <p:spPr/>
+        <p:txBody>
+          <a:bodyPr/>
+          <a:lstStyle/>
+          <a:p>
+            <a:pPr marL="342900" indent="-342900"/>
+            <a:r>
+              <a:rPr lang="en-US" dirty="0" smtClean="0"/>
+              <a:t>Get-Help</a:t>
+            </a:r>
+          </a:p>
+          <a:p>
+            <a:pPr marL="342900" indent="-342900"/>
+            <a:endParaRPr lang="en-US" dirty="0" smtClean="0"/>
+          </a:p>
+          <a:p>
+            <a:pPr marL="342900" indent="-342900"/>
+            <a:endParaRPr lang="en-US" dirty="0"/>
+          </a:p>
+        </p:txBody>
+      </p:sp>
+    </p:spTree>
+    <p:extLst>
+      <p:ext uri="{BB962C8B-B14F-4D97-AF65-F5344CB8AC3E}">
+        <p14:creationId xmlns:p14="http://schemas.microsoft.com/office/powerpoint/2010/main" val="3955589728"/>
+      </p:ext>
+    </p:extLst>
+  </p:cSld>
+  <p:clrMapOvr>
+    <a:masterClrMapping/>
+  </p:clrMapOvr>
+  <mc:AlternateContent xmlns:mc="http://schemas.openxmlformats.org/markup-compatibility/2006" xmlns:p14="http://schemas.microsoft.com/office/powerpoint/2010/main">
+    <mc:Choice Requires="p14">
+      <p:transition spd="med" p14:dur="700">
+        <p:fade/>
+      </p:transition>
+    </mc:Choice>
+    <mc:Fallback xmlns="">
+      <p:transition spd="med">
+        <p:fade/>
+      </p:transition>
+    </mc:Fallback>
+  </mc:AlternateContent>
+</p:sld>
+</file>
+
+<file path=ppt/slides/slide13.xml><?xml version="1.0" encoding="utf-8"?>
+<p:sld xmlns:a="http://schemas.openxmlformats.org/drawingml/2006/main" xmlns:r="http://schemas.openxmlformats.org/officeDocument/2006/relationships" xmlns:p="http://schemas.openxmlformats.org/presentationml/2006/main">
+  <p:cSld>
+    <p:spTree>
+      <p:nvGrpSpPr>
+        <p:cNvPr id="1" name=""/>
+        <p:cNvGrpSpPr/>
+        <p:nvPr/>
+      </p:nvGrpSpPr>
+      <p:grpSpPr>
+        <a:xfrm>
+          <a:off x="0" y="0"/>
+          <a:ext cx="0" cy="0"/>
+          <a:chOff x="0" y="0"/>
+          <a:chExt cx="0" cy="0"/>
+        </a:xfrm>
+      </p:grpSpPr>
+      <p:sp>
+        <p:nvSpPr>
+          <p:cNvPr id="2" name="Title 1">
+            <a:extLst>
+              <a:ext uri="{FF2B5EF4-FFF2-40B4-BE49-F238E27FC236}">
+                <a16:creationId xmlns:a16="http://schemas.microsoft.com/office/drawing/2014/main" id="{0D9FDAE6-550E-E975-BD01-08906590C472}"/>
+              </a:ext>
+            </a:extLst>
+          </p:cNvPr>
+          <p:cNvSpPr>
+            <a:spLocks noGrp="1"/>
+          </p:cNvSpPr>
+          <p:nvPr>
+            <p:ph type="title"/>
+          </p:nvPr>
+        </p:nvSpPr>
+        <p:spPr/>
+        <p:txBody>
+          <a:bodyPr/>
+          <a:lstStyle/>
+          <a:p>
+            <a:r>
+              <a:rPr lang="en-US" dirty="0" smtClean="0"/>
+              <a:t>Related Links</a:t>
+            </a:r>
+            <a:endParaRPr lang="en-US" dirty="0"/>
+          </a:p>
+        </p:txBody>
+      </p:sp>
+      <p:sp>
+        <p:nvSpPr>
+          <p:cNvPr id="5" name="Content Placeholder 4">
+            <a:extLst>
+              <a:ext uri="{FF2B5EF4-FFF2-40B4-BE49-F238E27FC236}">
+                <a16:creationId xmlns:a16="http://schemas.microsoft.com/office/drawing/2014/main" id="{8FBEB278-6650-3A11-7DCD-A90016572E5A}"/>
+              </a:ext>
+            </a:extLst>
+          </p:cNvPr>
+          <p:cNvSpPr>
+            <a:spLocks noGrp="1"/>
+          </p:cNvSpPr>
+          <p:nvPr>
+            <p:ph sz="quarter" idx="14"/>
+          </p:nvPr>
+        </p:nvSpPr>
+        <p:spPr/>
+        <p:txBody>
+          <a:bodyPr/>
+          <a:lstStyle/>
+          <a:p>
+            <a:pPr marL="342900" indent="-342900"/>
+            <a:r>
+              <a:rPr lang="en-US" dirty="0" smtClean="0"/>
+              <a:t>Related Links</a:t>
+            </a:r>
+          </a:p>
+          <a:p>
+            <a:pPr marL="342900" indent="-342900"/>
+            <a:endParaRPr lang="en-US" dirty="0" smtClean="0"/>
+          </a:p>
+          <a:p>
+            <a:pPr marL="342900" indent="-342900"/>
+            <a:endParaRPr lang="en-US" dirty="0"/>
+          </a:p>
+        </p:txBody>
+      </p:sp>
+    </p:spTree>
+    <p:extLst>
+      <p:ext uri="{BB962C8B-B14F-4D97-AF65-F5344CB8AC3E}">
+        <p14:creationId xmlns:p14="http://schemas.microsoft.com/office/powerpoint/2010/main" val="2713429391"/>
+      </p:ext>
+    </p:extLst>
+  </p:cSld>
+  <p:clrMapOvr>
+    <a:masterClrMapping/>
+  </p:clrMapOvr>
+  <mc:AlternateContent xmlns:mc="http://schemas.openxmlformats.org/markup-compatibility/2006" xmlns:p14="http://schemas.microsoft.com/office/powerpoint/2010/main">
+    <mc:Choice Requires="p14">
+      <p:transition spd="med" p14:dur="700">
+        <p:fade/>
+      </p:transition>
+    </mc:Choice>
+    <mc:Fallback xmlns="">
+      <p:transition spd="med">
+        <p:fade/>
+      </p:transition>
+    </mc:Fallback>
+  </mc:AlternateContent>
+</p:sld>
+</file>
+
+<file path=ppt/slides/slide14.xml><?xml version="1.0" encoding="utf-8"?>
+<p:sld xmlns:a="http://schemas.openxmlformats.org/drawingml/2006/main" xmlns:r="http://schemas.openxmlformats.org/officeDocument/2006/relationships" xmlns:p="http://schemas.openxmlformats.org/presentationml/2006/main">
+  <p:cSld>
+    <p:spTree>
+      <p:nvGrpSpPr>
+        <p:cNvPr id="1" name=""/>
+        <p:cNvGrpSpPr/>
+        <p:nvPr/>
+      </p:nvGrpSpPr>
+      <p:grpSpPr>
+        <a:xfrm>
+          <a:off x="0" y="0"/>
+          <a:ext cx="0" cy="0"/>
+          <a:chOff x="0" y="0"/>
+          <a:chExt cx="0" cy="0"/>
+        </a:xfrm>
+      </p:grpSpPr>
+      <p:sp>
+        <p:nvSpPr>
+          <p:cNvPr id="2" name="Title 1">
+            <a:extLst>
+              <a:ext uri="{FF2B5EF4-FFF2-40B4-BE49-F238E27FC236}">
+                <a16:creationId xmlns:a16="http://schemas.microsoft.com/office/drawing/2014/main" id="{0D9FDAE6-550E-E975-BD01-08906590C472}"/>
+              </a:ext>
+            </a:extLst>
+          </p:cNvPr>
+          <p:cNvSpPr>
+            <a:spLocks noGrp="1"/>
+          </p:cNvSpPr>
+          <p:nvPr>
+            <p:ph type="title"/>
+          </p:nvPr>
+        </p:nvSpPr>
+        <p:spPr/>
+        <p:txBody>
+          <a:bodyPr/>
+          <a:lstStyle/>
+          <a:p>
+            <a:r>
+              <a:rPr lang="en-US" dirty="0" smtClean="0"/>
+              <a:t>Get-Member</a:t>
+            </a:r>
+            <a:endParaRPr lang="en-US" dirty="0"/>
+          </a:p>
+        </p:txBody>
+      </p:sp>
+      <p:sp>
+        <p:nvSpPr>
+          <p:cNvPr id="5" name="Content Placeholder 4">
+            <a:extLst>
+              <a:ext uri="{FF2B5EF4-FFF2-40B4-BE49-F238E27FC236}">
+                <a16:creationId xmlns:a16="http://schemas.microsoft.com/office/drawing/2014/main" id="{8FBEB278-6650-3A11-7DCD-A90016572E5A}"/>
+              </a:ext>
+            </a:extLst>
+          </p:cNvPr>
+          <p:cNvSpPr>
+            <a:spLocks noGrp="1"/>
+          </p:cNvSpPr>
+          <p:nvPr>
+            <p:ph sz="quarter" idx="14"/>
+          </p:nvPr>
+        </p:nvSpPr>
+        <p:spPr/>
+        <p:txBody>
+          <a:bodyPr/>
+          <a:lstStyle/>
+          <a:p>
+            <a:pPr marL="342900" indent="-342900"/>
+            <a:r>
+              <a:rPr lang="en-US" dirty="0" smtClean="0"/>
+              <a:t>Get-Member –</a:t>
+            </a:r>
+            <a:r>
+              <a:rPr lang="en-US" dirty="0" err="1" smtClean="0"/>
+              <a:t>InputObject</a:t>
+            </a:r>
+            <a:r>
+              <a:rPr lang="en-US" dirty="0" smtClean="0"/>
+              <a:t> $</a:t>
+            </a:r>
+            <a:r>
+              <a:rPr lang="en-US" dirty="0" err="1" smtClean="0"/>
+              <a:t>myobject</a:t>
+            </a:r>
+            <a:endParaRPr lang="en-US" dirty="0" smtClean="0"/>
+          </a:p>
+          <a:p>
+            <a:pPr marL="342900" indent="-342900"/>
+            <a:endParaRPr lang="en-US" dirty="0" smtClean="0"/>
+          </a:p>
+          <a:p>
+            <a:pPr marL="342900" indent="-342900"/>
+            <a:endParaRPr lang="en-US" dirty="0"/>
+          </a:p>
+        </p:txBody>
+      </p:sp>
+    </p:spTree>
+    <p:extLst>
+      <p:ext uri="{BB962C8B-B14F-4D97-AF65-F5344CB8AC3E}">
+        <p14:creationId xmlns:p14="http://schemas.microsoft.com/office/powerpoint/2010/main" val="3185604838"/>
+      </p:ext>
+    </p:extLst>
+  </p:cSld>
+  <p:clrMapOvr>
+    <a:masterClrMapping/>
+  </p:clrMapOvr>
+  <mc:AlternateContent xmlns:mc="http://schemas.openxmlformats.org/markup-compatibility/2006" xmlns:p14="http://schemas.microsoft.com/office/powerpoint/2010/main">
+    <mc:Choice Requires="p14">
+      <p:transition spd="med" p14:dur="700">
+        <p:fade/>
+      </p:transition>
+    </mc:Choice>
+    <mc:Fallback xmlns="">
+      <p:transition spd="med">
+        <p:fade/>
+      </p:transition>
+    </mc:Fallback>
+  </mc:AlternateContent>
+</p:sld>
+</file>
+
+<file path=ppt/slides/slide15.xml><?xml version="1.0" encoding="utf-8"?>
+<p:sld xmlns:a="http://schemas.openxmlformats.org/drawingml/2006/main" xmlns:r="http://schemas.openxmlformats.org/officeDocument/2006/relationships" xmlns:p="http://schemas.openxmlformats.org/presentationml/2006/main">
+  <p:cSld>
+    <p:spTree>
+      <p:nvGrpSpPr>
+        <p:cNvPr id="1" name=""/>
+        <p:cNvGrpSpPr/>
+        <p:nvPr/>
+      </p:nvGrpSpPr>
+      <p:grpSpPr>
+        <a:xfrm>
+          <a:off x="0" y="0"/>
+          <a:ext cx="0" cy="0"/>
+          <a:chOff x="0" y="0"/>
+          <a:chExt cx="0" cy="0"/>
+        </a:xfrm>
+      </p:grpSpPr>
+      <p:sp>
+        <p:nvSpPr>
+          <p:cNvPr id="2" name="Title 1">
+            <a:extLst>
+              <a:ext uri="{FF2B5EF4-FFF2-40B4-BE49-F238E27FC236}">
+                <a16:creationId xmlns:a16="http://schemas.microsoft.com/office/drawing/2014/main" id="{0D9FDAE6-550E-E975-BD01-08906590C472}"/>
+              </a:ext>
+            </a:extLst>
+          </p:cNvPr>
+          <p:cNvSpPr>
+            <a:spLocks noGrp="1"/>
+          </p:cNvSpPr>
+          <p:nvPr>
+            <p:ph type="title"/>
+          </p:nvPr>
+        </p:nvSpPr>
+        <p:spPr/>
+        <p:txBody>
+          <a:bodyPr/>
+          <a:lstStyle/>
+          <a:p>
+            <a:r>
+              <a:rPr lang="en-US" dirty="0" smtClean="0"/>
+              <a:t>Resources</a:t>
+            </a:r>
+            <a:endParaRPr lang="en-US" dirty="0"/>
+          </a:p>
+        </p:txBody>
+      </p:sp>
+      <p:sp>
+        <p:nvSpPr>
+          <p:cNvPr id="5" name="Content Placeholder 4">
+            <a:extLst>
+              <a:ext uri="{FF2B5EF4-FFF2-40B4-BE49-F238E27FC236}">
+                <a16:creationId xmlns:a16="http://schemas.microsoft.com/office/drawing/2014/main" id="{8FBEB278-6650-3A11-7DCD-A90016572E5A}"/>
+              </a:ext>
+            </a:extLst>
+          </p:cNvPr>
+          <p:cNvSpPr>
+            <a:spLocks noGrp="1"/>
+          </p:cNvSpPr>
+          <p:nvPr>
+            <p:ph sz="quarter" idx="14"/>
+          </p:nvPr>
+        </p:nvSpPr>
+        <p:spPr/>
+        <p:txBody>
+          <a:bodyPr/>
+          <a:lstStyle/>
+          <a:p>
+            <a:pPr marL="342900" indent="-342900"/>
+            <a:r>
+              <a:rPr lang="en-US" dirty="0"/>
+              <a:t>https://developer.broadcom.com/</a:t>
+            </a:r>
+            <a:endParaRPr lang="en-US" dirty="0" smtClean="0"/>
+          </a:p>
+          <a:p>
+            <a:pPr marL="342900" indent="-342900"/>
+            <a:r>
+              <a:rPr lang="en-US" dirty="0"/>
+              <a:t>https://community.broadcom.com/home</a:t>
+            </a:r>
+            <a:endParaRPr lang="en-US" dirty="0" smtClean="0"/>
+          </a:p>
+          <a:p>
+            <a:pPr marL="342900" indent="-342900"/>
+            <a:endParaRPr lang="en-US" dirty="0"/>
+          </a:p>
+        </p:txBody>
+      </p:sp>
+    </p:spTree>
+    <p:extLst>
+      <p:ext uri="{BB962C8B-B14F-4D97-AF65-F5344CB8AC3E}">
+        <p14:creationId xmlns:p14="http://schemas.microsoft.com/office/powerpoint/2010/main" val="471172170"/>
+      </p:ext>
+    </p:extLst>
+  </p:cSld>
+  <p:clrMapOvr>
+    <a:masterClrMapping/>
+  </p:clrMapOvr>
+  <mc:AlternateContent xmlns:mc="http://schemas.openxmlformats.org/markup-compatibility/2006" xmlns:p14="http://schemas.microsoft.com/office/powerpoint/2010/main">
+    <mc:Choice Requires="p14">
+      <p:transition spd="med" p14:dur="700">
+        <p:fade/>
+      </p:transition>
+    </mc:Choice>
+    <mc:Fallback xmlns="">
+      <p:transition spd="med">
+        <p:fade/>
+      </p:transition>
+    </mc:Fallback>
+  </mc:AlternateContent>
+</p:sld>
+</file>
+
+<file path=ppt/slides/slide16.xml><?xml version="1.0" encoding="utf-8"?>
+<p:sld xmlns:a="http://schemas.openxmlformats.org/drawingml/2006/main" xmlns:r="http://schemas.openxmlformats.org/officeDocument/2006/relationships" xmlns:p="http://schemas.openxmlformats.org/presentationml/2006/main">
+  <p:cSld>
+    <p:spTree>
+      <p:nvGrpSpPr>
+        <p:cNvPr id="1" name=""/>
+        <p:cNvGrpSpPr/>
+        <p:nvPr/>
+      </p:nvGrpSpPr>
+      <p:grpSpPr>
+        <a:xfrm>
+          <a:off x="0" y="0"/>
+          <a:ext cx="0" cy="0"/>
+          <a:chOff x="0" y="0"/>
+          <a:chExt cx="0" cy="0"/>
+        </a:xfrm>
+      </p:grpSpPr>
+      <p:sp>
+        <p:nvSpPr>
+          <p:cNvPr id="2" name="Title 1">
+            <a:extLst>
+              <a:ext uri="{FF2B5EF4-FFF2-40B4-BE49-F238E27FC236}">
+                <a16:creationId xmlns:a16="http://schemas.microsoft.com/office/drawing/2014/main" id="{8EB89D28-96EC-2EFE-AC89-524B0B698CEA}"/>
+              </a:ext>
+            </a:extLst>
+          </p:cNvPr>
+          <p:cNvSpPr>
+            <a:spLocks noGrp="1"/>
+          </p:cNvSpPr>
+          <p:nvPr>
+            <p:ph type="title"/>
+          </p:nvPr>
+        </p:nvSpPr>
+        <p:spPr/>
+        <p:txBody>
+          <a:bodyPr/>
+          <a:lstStyle/>
+          <a:p>
+            <a:r>
+              <a:rPr lang="en-US" sz="4000" dirty="0">
+                <a:solidFill>
+                  <a:schemeClr val="bg1"/>
+                </a:solidFill>
+              </a:rPr>
+              <a:t>Please take </a:t>
+            </a:r>
+            <a:br>
+              <a:rPr lang="en-US" sz="4000" dirty="0">
+                <a:solidFill>
+                  <a:schemeClr val="bg1"/>
+                </a:solidFill>
+              </a:rPr>
+            </a:br>
+            <a:r>
+              <a:rPr lang="en-US" sz="4000" dirty="0">
+                <a:solidFill>
+                  <a:schemeClr val="bg1"/>
+                </a:solidFill>
+              </a:rPr>
+              <a:t>your survey.</a:t>
+            </a:r>
+            <a:endParaRPr lang="en-US" sz="4000" dirty="0"/>
+          </a:p>
+        </p:txBody>
+      </p:sp>
+      <p:sp>
+        <p:nvSpPr>
+          <p:cNvPr id="3" name="Subtitle 2">
+            <a:extLst>
+              <a:ext uri="{FF2B5EF4-FFF2-40B4-BE49-F238E27FC236}">
+                <a16:creationId xmlns:a16="http://schemas.microsoft.com/office/drawing/2014/main" id="{72AB6EE2-A795-0B32-903A-22365F29631E}"/>
+              </a:ext>
+            </a:extLst>
+          </p:cNvPr>
+          <p:cNvSpPr>
+            <a:spLocks noGrp="1"/>
+          </p:cNvSpPr>
+          <p:nvPr>
+            <p:ph type="subTitle" idx="10"/>
+          </p:nvPr>
+        </p:nvSpPr>
+        <p:spPr/>
+        <p:txBody>
+          <a:bodyPr/>
+          <a:lstStyle/>
+          <a:p>
+            <a:endParaRPr lang="en-US" dirty="0"/>
+          </a:p>
+        </p:txBody>
+      </p:sp>
+      <p:sp>
+        <p:nvSpPr>
+          <p:cNvPr id="4" name="TextBox 3">
+            <a:extLst>
+              <a:ext uri="{FF2B5EF4-FFF2-40B4-BE49-F238E27FC236}">
+                <a16:creationId xmlns:a16="http://schemas.microsoft.com/office/drawing/2014/main" id="{1296680E-15AF-2278-3275-B47338D845B6}"/>
+              </a:ext>
+            </a:extLst>
+          </p:cNvPr>
+          <p:cNvSpPr txBox="1"/>
+          <p:nvPr/>
+        </p:nvSpPr>
+        <p:spPr>
+          <a:xfrm>
+            <a:off x="588494" y="6395860"/>
+            <a:ext cx="3855223" cy="215444"/>
+          </a:xfrm>
+          <a:prstGeom prst="rect">
+            <a:avLst/>
+          </a:prstGeom>
+          <a:noFill/>
+        </p:spPr>
+        <p:txBody>
+          <a:bodyPr wrap="none" lIns="0" tIns="0" rIns="0" bIns="0" rtlCol="0">
+            <a:spAutoFit/>
+          </a:bodyPr>
+          <a:lstStyle/>
+          <a:p>
+            <a:pPr algn="l">
+              <a:lnSpc>
+                <a:spcPct val="100000"/>
+              </a:lnSpc>
+            </a:pPr>
+            <a:r>
+              <a:rPr lang="en-US" sz="700" spc="0" baseline="0" dirty="0">
+                <a:ln/>
+                <a:solidFill>
+                  <a:schemeClr val="bg1"/>
+                </a:solidFill>
+                <a:latin typeface="Metropolis-Regular"/>
+                <a:sym typeface="Metropolis-Regular"/>
+                <a:rtl val="0"/>
+              </a:rPr>
+              <a:t>Broadcom Proprietary and Confidential. Copyright © 2024 Broadcom. </a:t>
+            </a:r>
+          </a:p>
+          <a:p>
+            <a:pPr marL="0" marR="0" lvl="0" indent="0" algn="l" defTabSz="914400" rtl="0" eaLnBrk="1" fontAlgn="auto" latinLnBrk="0" hangingPunct="1">
+              <a:lnSpc>
+                <a:spcPct val="100000"/>
+              </a:lnSpc>
+              <a:spcBef>
+                <a:spcPts val="0"/>
+              </a:spcBef>
+              <a:spcAft>
+                <a:spcPts val="0"/>
+              </a:spcAft>
+              <a:buClrTx/>
+              <a:buSzTx/>
+              <a:buFontTx/>
+              <a:buNone/>
+              <a:tabLst/>
+              <a:defRPr/>
+            </a:pPr>
+            <a:r>
+              <a:rPr lang="en-US" sz="700" spc="0" baseline="0" dirty="0">
+                <a:ln/>
+                <a:solidFill>
+                  <a:schemeClr val="bg1"/>
+                </a:solidFill>
+                <a:latin typeface="Metropolis-Regular"/>
+                <a:sym typeface="Metropolis-Regular"/>
+                <a:rtl val="0"/>
+              </a:rPr>
+              <a:t>All Rights Reserved. The term “Broadcom” refers to Broadcom Inc. and/or its subsidiaries.</a:t>
+            </a:r>
+          </a:p>
+        </p:txBody>
+      </p:sp>
+    </p:spTree>
+    <p:extLst>
+      <p:ext uri="{BB962C8B-B14F-4D97-AF65-F5344CB8AC3E}">
+        <p14:creationId xmlns:p14="http://schemas.microsoft.com/office/powerpoint/2010/main" val="2198077059"/>
+      </p:ext>
+    </p:extLst>
+  </p:cSld>
+  <p:clrMapOvr>
+    <a:masterClrMapping/>
+  </p:clrMapOvr>
+  <mc:AlternateContent xmlns:mc="http://schemas.openxmlformats.org/markup-compatibility/2006" xmlns:p14="http://schemas.microsoft.com/office/powerpoint/2010/main">
+    <mc:Choice Requires="p14">
+      <p:transition spd="med" p14:dur="700">
+        <p:fade/>
+      </p:transition>
+    </mc:Choice>
+    <mc:Fallback xmlns="">
+      <p:transition spd="med">
+        <p:fade/>
+      </p:transition>
+    </mc:Fallback>
+  </mc:AlternateContent>
+</p:sld>
+</file>
+
+<file path=ppt/slides/slide17.xml><?xml version="1.0" encoding="utf-8"?>
+<p:sld xmlns:a="http://schemas.openxmlformats.org/drawingml/2006/main" xmlns:r="http://schemas.openxmlformats.org/officeDocument/2006/relationships" xmlns:p="http://schemas.openxmlformats.org/presentationml/2006/main">
+  <p:cSld>
+    <p:spTree>
+      <p:nvGrpSpPr>
+        <p:cNvPr id="1" name=""/>
+        <p:cNvGrpSpPr/>
+        <p:nvPr/>
+      </p:nvGrpSpPr>
+      <p:grpSpPr>
+        <a:xfrm>
+          <a:off x="0" y="0"/>
+          <a:ext cx="0" cy="0"/>
+          <a:chOff x="0" y="0"/>
+          <a:chExt cx="0" cy="0"/>
+        </a:xfrm>
+      </p:grpSpPr>
+      <p:sp>
+        <p:nvSpPr>
+          <p:cNvPr id="2" name="Title 1">
+            <a:extLst>
+              <a:ext uri="{FF2B5EF4-FFF2-40B4-BE49-F238E27FC236}">
                 <a16:creationId xmlns:a16="http://schemas.microsoft.com/office/drawing/2014/main" id="{8EB89D28-96EC-2EFE-AC89-524B0B698CEA}"/>
               </a:ext>
             </a:extLst>
@@ -21855,7 +22653,7 @@
 </file>
 
 <file path=ppt/slides/slide4.xml><?xml version="1.0" encoding="utf-8"?>
-<p:sld xmlns:a="http://schemas.openxmlformats.org/drawingml/2006/main" xmlns:r="http://schemas.openxmlformats.org/officeDocument/2006/relationships" xmlns:p="http://schemas.openxmlformats.org/presentationml/2006/main" show="0">
+<p:sld xmlns:a="http://schemas.openxmlformats.org/drawingml/2006/main" xmlns:r="http://schemas.openxmlformats.org/officeDocument/2006/relationships" xmlns:p="http://schemas.openxmlformats.org/presentationml/2006/main">
   <p:cSld>
     <p:spTree>
       <p:nvGrpSpPr>
@@ -21873,10 +22671,101 @@
       </p:grpSpPr>
       <p:sp>
         <p:nvSpPr>
-          <p:cNvPr id="2" name="Title 1">
+          <p:cNvPr id="13" name="Text Placeholder 12">
             <a:extLst>
               <a:ext uri="{FF2B5EF4-FFF2-40B4-BE49-F238E27FC236}">
-                <a16:creationId xmlns:a16="http://schemas.microsoft.com/office/drawing/2014/main" id="{61BBD50C-D47A-20CC-E6F1-C270E713D952}"/>
+                <a16:creationId xmlns:a16="http://schemas.microsoft.com/office/drawing/2014/main" id="{222FB045-4DAE-A1C8-DF9F-B4AA0ED41E3E}"/>
+              </a:ext>
+            </a:extLst>
+          </p:cNvPr>
+          <p:cNvSpPr>
+            <a:spLocks noGrp="1"/>
+          </p:cNvSpPr>
+          <p:nvPr>
+            <p:ph type="body" sz="quarter" idx="11"/>
+          </p:nvPr>
+        </p:nvSpPr>
+        <p:spPr/>
+        <p:txBody>
+          <a:bodyPr/>
+          <a:lstStyle/>
+          <a:p>
+            <a:r>
+              <a:rPr lang="en-US" dirty="0" smtClean="0"/>
+              <a:t>Justin Sider</a:t>
+            </a:r>
+            <a:endParaRPr lang="en-US" dirty="0"/>
+          </a:p>
+        </p:txBody>
+      </p:sp>
+      <p:sp>
+        <p:nvSpPr>
+          <p:cNvPr id="14" name="Text Placeholder 13">
+            <a:extLst>
+              <a:ext uri="{FF2B5EF4-FFF2-40B4-BE49-F238E27FC236}">
+                <a16:creationId xmlns:a16="http://schemas.microsoft.com/office/drawing/2014/main" id="{C02107BA-34B4-85E7-3812-729A10DEF8A7}"/>
+              </a:ext>
+            </a:extLst>
+          </p:cNvPr>
+          <p:cNvSpPr>
+            <a:spLocks noGrp="1"/>
+          </p:cNvSpPr>
+          <p:nvPr>
+            <p:ph type="body" sz="quarter" idx="12"/>
+          </p:nvPr>
+        </p:nvSpPr>
+        <p:spPr/>
+        <p:txBody>
+          <a:bodyPr/>
+          <a:lstStyle/>
+          <a:p>
+            <a:r>
+              <a:rPr lang="en-US" dirty="0" smtClean="0"/>
+              <a:t>Chief PowerShell Officer – Belay Technologies</a:t>
+            </a:r>
+            <a:endParaRPr lang="en-US" dirty="0"/>
+          </a:p>
+        </p:txBody>
+      </p:sp>
+      <p:sp>
+        <p:nvSpPr>
+          <p:cNvPr id="15" name="Text Placeholder 14">
+            <a:extLst>
+              <a:ext uri="{FF2B5EF4-FFF2-40B4-BE49-F238E27FC236}">
+                <a16:creationId xmlns:a16="http://schemas.microsoft.com/office/drawing/2014/main" id="{E4890F4D-2A2A-476E-87B3-B4740C3D18E2}"/>
+              </a:ext>
+            </a:extLst>
+          </p:cNvPr>
+          <p:cNvSpPr>
+            <a:spLocks noGrp="1"/>
+          </p:cNvSpPr>
+          <p:nvPr>
+            <p:ph type="body" sz="quarter" idx="14"/>
+          </p:nvPr>
+        </p:nvSpPr>
+        <p:spPr/>
+        <p:txBody>
+          <a:bodyPr/>
+          <a:lstStyle/>
+          <a:p>
+            <a:r>
+              <a:rPr lang="en-US" dirty="0"/>
+              <a:t>#</a:t>
+            </a:r>
+            <a:r>
+              <a:rPr lang="en-US" dirty="0" smtClean="0"/>
+              <a:t>CODE1744LV</a:t>
+            </a:r>
+            <a:endParaRPr lang="en-US" dirty="0"/>
+          </a:p>
+        </p:txBody>
+      </p:sp>
+      <p:sp>
+        <p:nvSpPr>
+          <p:cNvPr id="8" name="Title 4" title="Title">
+            <a:extLst>
+              <a:ext uri="{FF2B5EF4-FFF2-40B4-BE49-F238E27FC236}">
+                <a16:creationId xmlns:a16="http://schemas.microsoft.com/office/drawing/2014/main" id="{6AF36ABC-9C30-E49E-A919-AC10E0F93B73}"/>
               </a:ext>
             </a:extLst>
           </p:cNvPr>
@@ -21892,16 +22781,24 @@
           <a:bodyPr/>
           <a:lstStyle/>
           <a:p>
-            <a:endParaRPr lang="en-US"/>
+            <a:r>
+              <a:rPr lang="en-US" sz="4000" dirty="0" err="1" smtClean="0"/>
+              <a:t>PowerCLI</a:t>
+            </a:r>
+            <a:r>
+              <a:rPr lang="en-US" sz="4000" dirty="0" smtClean="0"/>
+              <a:t> 201</a:t>
+            </a:r>
+            <a:endParaRPr lang="en-US" dirty="0"/>
           </a:p>
         </p:txBody>
       </p:sp>
       <p:sp>
         <p:nvSpPr>
-          <p:cNvPr id="3" name="Subtitle 2">
+          <p:cNvPr id="9" name="Subtitle 5" title="Subtitle">
             <a:extLst>
               <a:ext uri="{FF2B5EF4-FFF2-40B4-BE49-F238E27FC236}">
-                <a16:creationId xmlns:a16="http://schemas.microsoft.com/office/drawing/2014/main" id="{95EF5967-220B-5169-0BB7-AA56F9CC275C}"/>
+                <a16:creationId xmlns:a16="http://schemas.microsoft.com/office/drawing/2014/main" id="{5C458ECF-94C9-BC18-C2C8-2A294DE58AE8}"/>
               </a:ext>
             </a:extLst>
           </p:cNvPr>
@@ -21909,7 +22806,49 @@
             <a:spLocks noGrp="1"/>
           </p:cNvSpPr>
           <p:nvPr>
-            <p:ph type="subTitle" idx="10"/>
+            <p:ph type="subTitle" idx="4294967295"/>
+          </p:nvPr>
+        </p:nvSpPr>
+        <p:spPr>
+          <a:xfrm>
+            <a:off x="588494" y="4446003"/>
+            <a:ext cx="5505917" cy="416403"/>
+          </a:xfrm>
+        </p:spPr>
+        <p:txBody>
+          <a:bodyPr/>
+          <a:lstStyle/>
+          <a:p>
+            <a:r>
+              <a:rPr lang="en-US" dirty="0" smtClean="0">
+                <a:solidFill>
+                  <a:schemeClr val="bg1"/>
+                </a:solidFill>
+              </a:rPr>
+              <a:t>From the Shell to Writing Scripts</a:t>
+            </a:r>
+            <a:endParaRPr lang="en-US" dirty="0">
+              <a:solidFill>
+                <a:schemeClr val="bg1"/>
+              </a:solidFill>
+            </a:endParaRPr>
+          </a:p>
+        </p:txBody>
+      </p:sp>
+      <p:sp>
+        <p:nvSpPr>
+          <p:cNvPr id="16" name="Text Placeholder 15">
+            <a:extLst>
+              <a:ext uri="{FF2B5EF4-FFF2-40B4-BE49-F238E27FC236}">
+                <a16:creationId xmlns:a16="http://schemas.microsoft.com/office/drawing/2014/main" id="{BF074FE7-E33A-7CFF-F7B5-3B08607D6660}"/>
+              </a:ext>
+            </a:extLst>
+          </p:cNvPr>
+          <p:cNvSpPr>
+            <a:spLocks noGrp="1"/>
+          </p:cNvSpPr>
+          <p:nvPr>
+            <p:ph type="body" sz="quarter" idx="15"/>
           </p:nvPr>
         </p:nvSpPr>
         <p:spPr/>
@@ -21917,64 +22856,97 @@
           <a:bodyPr/>
           <a:lstStyle/>
           <a:p>
+            <a:r>
+              <a:rPr lang="en-US" dirty="0" smtClean="0"/>
+              <a:t>CODE1744LV</a:t>
+            </a:r>
             <a:endParaRPr lang="en-US" dirty="0"/>
           </a:p>
         </p:txBody>
       </p:sp>
       <p:sp>
         <p:nvSpPr>
-          <p:cNvPr id="4" name="Text Placeholder 3">
+          <p:cNvPr id="2" name="TextBox 1">
             <a:extLst>
               <a:ext uri="{FF2B5EF4-FFF2-40B4-BE49-F238E27FC236}">
-                <a16:creationId xmlns:a16="http://schemas.microsoft.com/office/drawing/2014/main" id="{4E1B46B0-8B3F-FC6D-D991-49C3BE248DB9}"/>
+                <a16:creationId xmlns:a16="http://schemas.microsoft.com/office/drawing/2014/main" id="{918E8234-B800-C09A-FE76-981EEA56F954}"/>
               </a:ext>
             </a:extLst>
           </p:cNvPr>
-          <p:cNvSpPr>
-            <a:spLocks noGrp="1"/>
-          </p:cNvSpPr>
-          <p:nvPr>
-            <p:ph type="body" sz="quarter" idx="12"/>
-          </p:nvPr>
+          <p:cNvSpPr txBox="1"/>
+          <p:nvPr/>
         </p:nvSpPr>
-        <p:spPr/>
+        <p:spPr>
+          <a:xfrm>
+            <a:off x="588494" y="6395860"/>
+            <a:ext cx="3855223" cy="215444"/>
+          </a:xfrm>
+          <a:prstGeom prst="rect">
+            <a:avLst/>
+          </a:prstGeom>
+          <a:noFill/>
+        </p:spPr>
         <p:txBody>
-          <a:bodyPr/>
+          <a:bodyPr wrap="none" lIns="0" tIns="0" rIns="0" bIns="0" rtlCol="0">
+            <a:spAutoFit/>
+          </a:bodyPr>
           <a:lstStyle/>
           <a:p>
-            <a:endParaRPr lang="en-US" dirty="0"/>
-          </a:p>
-        </p:txBody>
-      </p:sp>
-      <p:sp>
-        <p:nvSpPr>
-          <p:cNvPr id="5" name="Text Placeholder 4">
-            <a:extLst>
-              <a:ext uri="{FF2B5EF4-FFF2-40B4-BE49-F238E27FC236}">
-                <a16:creationId xmlns:a16="http://schemas.microsoft.com/office/drawing/2014/main" id="{8E93427D-9CB4-A44D-35EC-0DE1989F5A84}"/>
-              </a:ext>
-            </a:extLst>
-          </p:cNvPr>
-          <p:cNvSpPr>
-            <a:spLocks noGrp="1"/>
-          </p:cNvSpPr>
-          <p:nvPr>
-            <p:ph type="body" sz="quarter" idx="13"/>
-          </p:nvPr>
-        </p:nvSpPr>
-        <p:spPr/>
-        <p:txBody>
-          <a:bodyPr/>
-          <a:lstStyle/>
-          <a:p>
-            <a:endParaRPr lang="en-US"/>
+            <a:pPr algn="l">
+              <a:lnSpc>
+                <a:spcPct val="100000"/>
+              </a:lnSpc>
+            </a:pPr>
+            <a:r>
+              <a:rPr lang="en-US" sz="700" spc="0" baseline="0" dirty="0">
+                <a:ln/>
+                <a:solidFill>
+                  <a:schemeClr val="bg1"/>
+                </a:solidFill>
+                <a:latin typeface="Metropolis-Regular"/>
+                <a:sym typeface="Metropolis-Regular"/>
+                <a:rtl val="0"/>
+              </a:rPr>
+              <a:t>Broadcom Proprietary and Confidential. Copyright © 2024 Broadcom. </a:t>
+            </a:r>
+          </a:p>
+          <a:p>
+            <a:pPr marL="0" marR="0" lvl="0" indent="0" algn="l" defTabSz="914400" rtl="0" eaLnBrk="1" fontAlgn="auto" latinLnBrk="0" hangingPunct="1">
+              <a:lnSpc>
+                <a:spcPct val="100000"/>
+              </a:lnSpc>
+              <a:spcBef>
+                <a:spcPts val="0"/>
+              </a:spcBef>
+              <a:spcAft>
+                <a:spcPts val="0"/>
+              </a:spcAft>
+              <a:buClrTx/>
+              <a:buSzTx/>
+              <a:buFontTx/>
+              <a:buNone/>
+              <a:tabLst/>
+              <a:defRPr/>
+            </a:pPr>
+            <a:r>
+              <a:rPr lang="en-US" sz="700" spc="0" baseline="0" dirty="0">
+                <a:ln/>
+                <a:solidFill>
+                  <a:schemeClr val="bg1"/>
+                </a:solidFill>
+                <a:latin typeface="Metropolis-Regular"/>
+                <a:sym typeface="Metropolis-Regular"/>
+                <a:rtl val="0"/>
+              </a:rPr>
+              <a:t>All Rights Reserved. The term “Broadcom” refers to Broadcom Inc. and/or its subsidiaries.</a:t>
+            </a:r>
           </a:p>
         </p:txBody>
       </p:sp>
     </p:spTree>
     <p:extLst>
       <p:ext uri="{BB962C8B-B14F-4D97-AF65-F5344CB8AC3E}">
-        <p14:creationId xmlns:p14="http://schemas.microsoft.com/office/powerpoint/2010/main" val="313266367"/>
+        <p14:creationId xmlns:p14="http://schemas.microsoft.com/office/powerpoint/2010/main" val="3129537273"/>
       </p:ext>
     </p:extLst>
   </p:cSld>
@@ -22015,85 +22987,10 @@
       </p:grpSpPr>
       <p:sp>
         <p:nvSpPr>
-          <p:cNvPr id="13" name="Text Placeholder 12">
+          <p:cNvPr id="2" name="Title 1">
             <a:extLst>
               <a:ext uri="{FF2B5EF4-FFF2-40B4-BE49-F238E27FC236}">
-                <a16:creationId xmlns:a16="http://schemas.microsoft.com/office/drawing/2014/main" id="{222FB045-4DAE-A1C8-DF9F-B4AA0ED41E3E}"/>
-              </a:ext>
-            </a:extLst>
-          </p:cNvPr>
-          <p:cNvSpPr>
-            <a:spLocks noGrp="1"/>
-          </p:cNvSpPr>
-          <p:nvPr>
-            <p:ph type="body" sz="quarter" idx="11"/>
-          </p:nvPr>
-        </p:nvSpPr>
-        <p:spPr/>
-        <p:txBody>
-          <a:bodyPr/>
-          <a:lstStyle/>
-          <a:p>
-            <a:endParaRPr lang="en-US"/>
-          </a:p>
-        </p:txBody>
-      </p:sp>
-      <p:sp>
-        <p:nvSpPr>
-          <p:cNvPr id="14" name="Text Placeholder 13">
-            <a:extLst>
-              <a:ext uri="{FF2B5EF4-FFF2-40B4-BE49-F238E27FC236}">
-                <a16:creationId xmlns:a16="http://schemas.microsoft.com/office/drawing/2014/main" id="{C02107BA-34B4-85E7-3812-729A10DEF8A7}"/>
-              </a:ext>
-            </a:extLst>
-          </p:cNvPr>
-          <p:cNvSpPr>
-            <a:spLocks noGrp="1"/>
-          </p:cNvSpPr>
-          <p:nvPr>
-            <p:ph type="body" sz="quarter" idx="12"/>
-          </p:nvPr>
-        </p:nvSpPr>
-        <p:spPr/>
-        <p:txBody>
-          <a:bodyPr/>
-          <a:lstStyle/>
-          <a:p>
-            <a:endParaRPr lang="en-US"/>
-          </a:p>
-        </p:txBody>
-      </p:sp>
-      <p:sp>
-        <p:nvSpPr>
-          <p:cNvPr id="15" name="Text Placeholder 14">
-            <a:extLst>
-              <a:ext uri="{FF2B5EF4-FFF2-40B4-BE49-F238E27FC236}">
-                <a16:creationId xmlns:a16="http://schemas.microsoft.com/office/drawing/2014/main" id="{E4890F4D-2A2A-476E-87B3-B4740C3D18E2}"/>
-              </a:ext>
-            </a:extLst>
-          </p:cNvPr>
-          <p:cNvSpPr>
-            <a:spLocks noGrp="1"/>
-          </p:cNvSpPr>
-          <p:nvPr>
-            <p:ph type="body" sz="quarter" idx="14"/>
-          </p:nvPr>
-        </p:nvSpPr>
-        <p:spPr/>
-        <p:txBody>
-          <a:bodyPr/>
-          <a:lstStyle/>
-          <a:p>
-            <a:endParaRPr lang="en-US" dirty="0"/>
-          </a:p>
-        </p:txBody>
-      </p:sp>
-      <p:sp>
-        <p:nvSpPr>
-          <p:cNvPr id="8" name="Title 4" title="Title">
-            <a:extLst>
-              <a:ext uri="{FF2B5EF4-FFF2-40B4-BE49-F238E27FC236}">
-                <a16:creationId xmlns:a16="http://schemas.microsoft.com/office/drawing/2014/main" id="{6AF36ABC-9C30-E49E-A919-AC10E0F93B73}"/>
+                <a16:creationId xmlns:a16="http://schemas.microsoft.com/office/drawing/2014/main" id="{0D9FDAE6-550E-E975-BD01-08906590C472}"/>
               </a:ext>
             </a:extLst>
           </p:cNvPr>
@@ -22109,20 +23006,16 @@
           <a:bodyPr/>
           <a:lstStyle/>
           <a:p>
-            <a:r>
-              <a:rPr lang="en-US" sz="4000" dirty="0"/>
-              <a:t>Session Title</a:t>
-            </a:r>
             <a:endParaRPr lang="en-US" dirty="0"/>
           </a:p>
         </p:txBody>
       </p:sp>
       <p:sp>
         <p:nvSpPr>
-          <p:cNvPr id="9" name="Subtitle 5" title="Subtitle">
+          <p:cNvPr id="4" name="Subtitle 3">
             <a:extLst>
               <a:ext uri="{FF2B5EF4-FFF2-40B4-BE49-F238E27FC236}">
-                <a16:creationId xmlns:a16="http://schemas.microsoft.com/office/drawing/2014/main" id="{5C458ECF-94C9-BC18-C2C8-2A294DE58AE8}"/>
+                <a16:creationId xmlns:a16="http://schemas.microsoft.com/office/drawing/2014/main" id="{8F886DCA-5B59-24C0-2C79-4E661832C1EA}"/>
               </a:ext>
             </a:extLst>
           </p:cNvPr>
@@ -22130,36 +23023,24 @@
             <a:spLocks noGrp="1"/>
           </p:cNvSpPr>
           <p:nvPr>
-            <p:ph type="subTitle" idx="4294967295"/>
+            <p:ph type="subTitle" idx="10"/>
           </p:nvPr>
         </p:nvSpPr>
-        <p:spPr>
-          <a:xfrm>
-            <a:off x="588494" y="4446003"/>
-            <a:ext cx="5505917" cy="416403"/>
-          </a:xfrm>
-        </p:spPr>
+        <p:spPr/>
         <p:txBody>
           <a:bodyPr/>
           <a:lstStyle/>
           <a:p>
-            <a:r>
-              <a:rPr lang="en-US" dirty="0">
-                <a:solidFill>
-                  <a:schemeClr val="bg1"/>
-                </a:solidFill>
-              </a:rPr>
-              <a:t>Session Subtitle</a:t>
-            </a:r>
+            <a:endParaRPr lang="en-US"/>
           </a:p>
         </p:txBody>
       </p:sp>
       <p:sp>
         <p:nvSpPr>
-          <p:cNvPr id="16" name="Text Placeholder 15">
+          <p:cNvPr id="5" name="Content Placeholder 4">
             <a:extLst>
               <a:ext uri="{FF2B5EF4-FFF2-40B4-BE49-F238E27FC236}">
-                <a16:creationId xmlns:a16="http://schemas.microsoft.com/office/drawing/2014/main" id="{BF074FE7-E33A-7CFF-F7B5-3B08607D6660}"/>
+                <a16:creationId xmlns:a16="http://schemas.microsoft.com/office/drawing/2014/main" id="{8FBEB278-6650-3A11-7DCD-A90016572E5A}"/>
               </a:ext>
             </a:extLst>
           </p:cNvPr>
@@ -22167,7 +23048,7 @@
             <a:spLocks noGrp="1"/>
           </p:cNvSpPr>
           <p:nvPr>
-            <p:ph type="body" sz="quarter" idx="15"/>
+            <p:ph sz="quarter" idx="14"/>
           </p:nvPr>
         </p:nvSpPr>
         <p:spPr/>
@@ -22175,85 +23056,17 @@
           <a:bodyPr/>
           <a:lstStyle/>
           <a:p>
-            <a:endParaRPr lang="en-US" dirty="0"/>
-          </a:p>
-        </p:txBody>
-      </p:sp>
-      <p:sp>
-        <p:nvSpPr>
-          <p:cNvPr id="2" name="TextBox 1">
-            <a:extLst>
-              <a:ext uri="{FF2B5EF4-FFF2-40B4-BE49-F238E27FC236}">
-                <a16:creationId xmlns:a16="http://schemas.microsoft.com/office/drawing/2014/main" id="{918E8234-B800-C09A-FE76-981EEA56F954}"/>
-              </a:ext>
-            </a:extLst>
-          </p:cNvPr>
-          <p:cNvSpPr txBox="1"/>
-          <p:nvPr/>
-        </p:nvSpPr>
-        <p:spPr>
-          <a:xfrm>
-            <a:off x="588494" y="6395860"/>
-            <a:ext cx="3855223" cy="215444"/>
-          </a:xfrm>
-          <a:prstGeom prst="rect">
-            <a:avLst/>
-          </a:prstGeom>
-          <a:noFill/>
-        </p:spPr>
-        <p:txBody>
-          <a:bodyPr wrap="none" lIns="0" tIns="0" rIns="0" bIns="0" rtlCol="0">
-            <a:spAutoFit/>
-          </a:bodyPr>
-          <a:lstStyle/>
-          <a:p>
-            <a:pPr algn="l">
-              <a:lnSpc>
-                <a:spcPct val="100000"/>
-              </a:lnSpc>
-            </a:pPr>
-            <a:r>
-              <a:rPr lang="en-US" sz="700" spc="0" baseline="0" dirty="0">
-                <a:ln/>
-                <a:solidFill>
-                  <a:schemeClr val="bg1"/>
-                </a:solidFill>
-                <a:latin typeface="Metropolis-Regular"/>
-                <a:sym typeface="Metropolis-Regular"/>
-                <a:rtl val="0"/>
-              </a:rPr>
-              <a:t>Broadcom Proprietary and Confidential. Copyright © 2024 Broadcom. </a:t>
-            </a:r>
-          </a:p>
-          <a:p>
-            <a:pPr marL="0" marR="0" lvl="0" indent="0" algn="l" defTabSz="914400" rtl="0" eaLnBrk="1" fontAlgn="auto" latinLnBrk="0" hangingPunct="1">
-              <a:lnSpc>
-                <a:spcPct val="100000"/>
-              </a:lnSpc>
-              <a:spcBef>
-                <a:spcPts val="0"/>
-              </a:spcBef>
-              <a:spcAft>
-                <a:spcPts val="0"/>
-              </a:spcAft>
-              <a:buClrTx/>
-              <a:buSzTx/>
-              <a:buFontTx/>
-              <a:buNone/>
-              <a:tabLst/>
-              <a:defRPr/>
-            </a:pPr>
-            <a:r>
-              <a:rPr lang="en-US" sz="700" spc="0" baseline="0" dirty="0">
-                <a:ln/>
-                <a:solidFill>
-                  <a:schemeClr val="bg1"/>
-                </a:solidFill>
-                <a:latin typeface="Metropolis-Regular"/>
-                <a:sym typeface="Metropolis-Regular"/>
-                <a:rtl val="0"/>
-              </a:rPr>
-              <a:t>All Rights Reserved. The term “Broadcom” refers to Broadcom Inc. and/or its subsidiaries.</a:t>
+            <a:r>
+              <a:rPr lang="en-US" dirty="0"/>
+              <a:t>In this session we will quickly review the PowerShell basics before jumping into the advanced topics of script writing. The focus will be on how to convert the UI actions into actionable PowerShell code. This session will cover the vSphere Developer center 'Code Capture' feature so that new </a:t>
+            </a:r>
+            <a:r>
+              <a:rPr lang="en-US" dirty="0" err="1"/>
+              <a:t>PowerCLI</a:t>
+            </a:r>
+            <a:r>
+              <a:rPr lang="en-US" dirty="0"/>
+              <a:t> users can understand how to generate their own code from the Center user interface.</a:t>
             </a:r>
           </a:p>
         </p:txBody>
@@ -22261,7 +23074,7 @@
     </p:spTree>
     <p:extLst>
       <p:ext uri="{BB962C8B-B14F-4D97-AF65-F5344CB8AC3E}">
-        <p14:creationId xmlns:p14="http://schemas.microsoft.com/office/powerpoint/2010/main" val="3129537273"/>
+        <p14:creationId xmlns:p14="http://schemas.microsoft.com/office/powerpoint/2010/main" val="425867983"/>
       </p:ext>
     </p:extLst>
   </p:cSld>
@@ -22302,13 +23115,7 @@
       </p:grpSpPr>
       <p:sp>
         <p:nvSpPr>
-          <p:cNvPr id="2" name="Title 1">
-            <a:extLst>
-              <a:ext uri="{FF2B5EF4-FFF2-40B4-BE49-F238E27FC236}">
-                <a16:creationId xmlns:a16="http://schemas.microsoft.com/office/drawing/2014/main" id="{0D9FDAE6-550E-E975-BD01-08906590C472}"/>
-              </a:ext>
-            </a:extLst>
-          </p:cNvPr>
+          <p:cNvPr id="2" name="Title 1"/>
           <p:cNvSpPr>
             <a:spLocks noGrp="1"/>
           </p:cNvSpPr>
@@ -22321,44 +23128,17 @@
           <a:bodyPr/>
           <a:lstStyle/>
           <a:p>
+            <a:r>
+              <a:rPr lang="en-US" dirty="0" smtClean="0"/>
+              <a:t>Agenda</a:t>
+            </a:r>
             <a:endParaRPr lang="en-US" dirty="0"/>
           </a:p>
         </p:txBody>
       </p:sp>
       <p:sp>
         <p:nvSpPr>
-          <p:cNvPr id="4" name="Subtitle 3">
-            <a:extLst>
-              <a:ext uri="{FF2B5EF4-FFF2-40B4-BE49-F238E27FC236}">
-                <a16:creationId xmlns:a16="http://schemas.microsoft.com/office/drawing/2014/main" id="{8F886DCA-5B59-24C0-2C79-4E661832C1EA}"/>
-              </a:ext>
-            </a:extLst>
-          </p:cNvPr>
-          <p:cNvSpPr>
-            <a:spLocks noGrp="1"/>
-          </p:cNvSpPr>
-          <p:nvPr>
-            <p:ph type="subTitle" idx="10"/>
-          </p:nvPr>
-        </p:nvSpPr>
-        <p:spPr/>
-        <p:txBody>
-          <a:bodyPr/>
-          <a:lstStyle/>
-          <a:p>
-            <a:endParaRPr lang="en-US"/>
-          </a:p>
-        </p:txBody>
-      </p:sp>
-      <p:sp>
-        <p:nvSpPr>
-          <p:cNvPr id="5" name="Content Placeholder 4">
-            <a:extLst>
-              <a:ext uri="{FF2B5EF4-FFF2-40B4-BE49-F238E27FC236}">
-                <a16:creationId xmlns:a16="http://schemas.microsoft.com/office/drawing/2014/main" id="{8FBEB278-6650-3A11-7DCD-A90016572E5A}"/>
-              </a:ext>
-            </a:extLst>
-          </p:cNvPr>
+          <p:cNvPr id="4" name="Content Placeholder 3"/>
           <p:cNvSpPr>
             <a:spLocks noGrp="1"/>
           </p:cNvSpPr>
@@ -22371,6 +23151,131 @@
           <a:bodyPr/>
           <a:lstStyle/>
           <a:p>
+            <a:pPr marL="457200" indent="-457200">
+              <a:buFont typeface="+mj-lt"/>
+              <a:buAutoNum type="arabicPeriod"/>
+            </a:pPr>
+            <a:r>
+              <a:rPr lang="en-US" dirty="0" smtClean="0"/>
+              <a:t>PowerShell Basics</a:t>
+            </a:r>
+          </a:p>
+          <a:p>
+            <a:pPr marL="457200" indent="-457200">
+              <a:buFont typeface="+mj-lt"/>
+              <a:buAutoNum type="arabicPeriod"/>
+            </a:pPr>
+            <a:r>
+              <a:rPr lang="en-US" dirty="0" smtClean="0"/>
+              <a:t>What is a Script?</a:t>
+            </a:r>
+          </a:p>
+          <a:p>
+            <a:pPr marL="457200" indent="-457200">
+              <a:buFont typeface="+mj-lt"/>
+              <a:buAutoNum type="arabicPeriod"/>
+            </a:pPr>
+            <a:r>
+              <a:rPr lang="en-US" dirty="0" smtClean="0"/>
+              <a:t>VMware Developer Center</a:t>
+            </a:r>
+          </a:p>
+          <a:p>
+            <a:pPr marL="457200" indent="-457200">
+              <a:buFont typeface="+mj-lt"/>
+              <a:buAutoNum type="arabicPeriod"/>
+            </a:pPr>
+            <a:r>
+              <a:rPr lang="en-US" dirty="0" smtClean="0"/>
+              <a:t>PowerShell vs. C# vs. </a:t>
+            </a:r>
+            <a:r>
+              <a:rPr lang="en-US" dirty="0" err="1" smtClean="0"/>
+              <a:t>.Net</a:t>
+            </a:r>
+            <a:endParaRPr lang="en-US" dirty="0" smtClean="0"/>
+          </a:p>
+          <a:p>
+            <a:pPr marL="457200" indent="-457200">
+              <a:buFont typeface="+mj-lt"/>
+              <a:buAutoNum type="arabicPeriod"/>
+            </a:pPr>
+            <a:r>
+              <a:rPr lang="en-US" dirty="0" smtClean="0"/>
+              <a:t>Converting Developer Center Output to Useable PowerShell/</a:t>
+            </a:r>
+            <a:r>
+              <a:rPr lang="en-US" dirty="0" err="1" smtClean="0"/>
+              <a:t>PowerCLI</a:t>
+            </a:r>
+            <a:endParaRPr lang="en-US" dirty="0" smtClean="0"/>
+          </a:p>
+          <a:p>
+            <a:pPr marL="457200" indent="-457200">
+              <a:buFont typeface="+mj-lt"/>
+              <a:buAutoNum type="arabicPeriod"/>
+            </a:pPr>
+            <a:r>
+              <a:rPr lang="en-US" dirty="0" smtClean="0"/>
+              <a:t>Get-Help</a:t>
+            </a:r>
+          </a:p>
+          <a:p>
+            <a:pPr marL="457200" indent="-457200">
+              <a:buFont typeface="+mj-lt"/>
+              <a:buAutoNum type="arabicPeriod"/>
+            </a:pPr>
+            <a:r>
+              <a:rPr lang="en-US" dirty="0" smtClean="0"/>
+              <a:t>Related Links</a:t>
+            </a:r>
+          </a:p>
+          <a:p>
+            <a:pPr marL="457200" indent="-457200">
+              <a:buFont typeface="+mj-lt"/>
+              <a:buAutoNum type="arabicPeriod"/>
+            </a:pPr>
+            <a:r>
+              <a:rPr lang="en-US" dirty="0" smtClean="0"/>
+              <a:t>Get-Member</a:t>
+            </a:r>
+          </a:p>
+          <a:p>
+            <a:pPr marL="457200" indent="-457200">
+              <a:buFont typeface="+mj-lt"/>
+              <a:buAutoNum type="arabicPeriod"/>
+            </a:pPr>
+            <a:r>
+              <a:rPr lang="en-US" dirty="0" smtClean="0"/>
+              <a:t>Resources</a:t>
+            </a:r>
+          </a:p>
+          <a:p>
+            <a:pPr marL="457200" indent="-457200">
+              <a:buFont typeface="+mj-lt"/>
+              <a:buAutoNum type="arabicPeriod"/>
+            </a:pPr>
+            <a:endParaRPr lang="en-US" dirty="0" smtClean="0"/>
+          </a:p>
+          <a:p>
+            <a:pPr marL="457200" indent="-457200">
+              <a:buFont typeface="+mj-lt"/>
+              <a:buAutoNum type="arabicPeriod"/>
+            </a:pPr>
+            <a:endParaRPr lang="en-US" dirty="0" smtClean="0"/>
+          </a:p>
+          <a:p>
+            <a:pPr marL="457200" indent="-457200">
+              <a:buFont typeface="+mj-lt"/>
+              <a:buAutoNum type="arabicPeriod"/>
+            </a:pPr>
+            <a:endParaRPr lang="en-US" dirty="0" smtClean="0"/>
+          </a:p>
+          <a:p>
+            <a:pPr marL="457200" indent="-457200">
+              <a:buFont typeface="+mj-lt"/>
+              <a:buAutoNum type="arabicPeriod"/>
+            </a:pPr>
             <a:endParaRPr lang="en-US" dirty="0"/>
           </a:p>
         </p:txBody>
@@ -22378,7 +23283,7 @@
     </p:spTree>
     <p:extLst>
       <p:ext uri="{BB962C8B-B14F-4D97-AF65-F5344CB8AC3E}">
-        <p14:creationId xmlns:p14="http://schemas.microsoft.com/office/powerpoint/2010/main" val="594509113"/>
+        <p14:creationId xmlns:p14="http://schemas.microsoft.com/office/powerpoint/2010/main" val="1925369033"/>
       </p:ext>
     </p:extLst>
   </p:cSld>
@@ -22438,32 +23343,11 @@
           <a:bodyPr/>
           <a:lstStyle/>
           <a:p>
+            <a:r>
+              <a:rPr lang="en-US" dirty="0" smtClean="0"/>
+              <a:t>PowerShell Basics</a:t>
+            </a:r>
             <a:endParaRPr lang="en-US" dirty="0"/>
-          </a:p>
-        </p:txBody>
-      </p:sp>
-      <p:sp>
-        <p:nvSpPr>
-          <p:cNvPr id="4" name="Subtitle 3">
-            <a:extLst>
-              <a:ext uri="{FF2B5EF4-FFF2-40B4-BE49-F238E27FC236}">
-                <a16:creationId xmlns:a16="http://schemas.microsoft.com/office/drawing/2014/main" id="{8F886DCA-5B59-24C0-2C79-4E661832C1EA}"/>
-              </a:ext>
-            </a:extLst>
-          </p:cNvPr>
-          <p:cNvSpPr>
-            <a:spLocks noGrp="1"/>
-          </p:cNvSpPr>
-          <p:nvPr>
-            <p:ph type="subTitle" idx="10"/>
-          </p:nvPr>
-        </p:nvSpPr>
-        <p:spPr/>
-        <p:txBody>
-          <a:bodyPr/>
-          <a:lstStyle/>
-          <a:p>
-            <a:endParaRPr lang="en-US"/>
           </a:p>
         </p:txBody>
       </p:sp>
@@ -22488,18 +23372,18 @@
           <a:bodyPr/>
           <a:lstStyle/>
           <a:p>
-            <a:r>
-              <a:rPr lang="en-US" dirty="0"/>
-              <a:t>In this session we will quickly review the PowerShell basics before jumping into the advanced topics of script writing. The focus will be on how to convert the UI actions into actionable PowerShell code. This session will cover the vSphere Developer center 'Code Capture' feature so that new </a:t>
-            </a:r>
-            <a:r>
-              <a:rPr lang="en-US" dirty="0" err="1"/>
-              <a:t>PowerCLI</a:t>
-            </a:r>
-            <a:r>
-              <a:rPr lang="en-US" dirty="0"/>
-              <a:t> users can understand how to generate their own code from the Center user interface.</a:t>
-            </a:r>
+            <a:pPr marL="342900" indent="-342900"/>
+            <a:r>
+              <a:rPr lang="en-US" dirty="0" smtClean="0"/>
+              <a:t>PowerShell Basics</a:t>
+            </a:r>
+          </a:p>
+          <a:p>
+            <a:pPr marL="342900" indent="-342900"/>
+            <a:endParaRPr lang="en-US" dirty="0" smtClean="0"/>
+          </a:p>
+          <a:p>
+            <a:pPr marL="342900" indent="-342900"/>
             <a:endParaRPr lang="en-US" dirty="0"/>
           </a:p>
         </p:txBody>
@@ -22507,7 +23391,7 @@
     </p:spTree>
     <p:extLst>
       <p:ext uri="{BB962C8B-B14F-4D97-AF65-F5344CB8AC3E}">
-        <p14:creationId xmlns:p14="http://schemas.microsoft.com/office/powerpoint/2010/main" val="425867983"/>
+        <p14:creationId xmlns:p14="http://schemas.microsoft.com/office/powerpoint/2010/main" val="594509113"/>
       </p:ext>
     </p:extLst>
   </p:cSld>
@@ -22551,7 +23435,7 @@
           <p:cNvPr id="2" name="Title 1">
             <a:extLst>
               <a:ext uri="{FF2B5EF4-FFF2-40B4-BE49-F238E27FC236}">
-                <a16:creationId xmlns:a16="http://schemas.microsoft.com/office/drawing/2014/main" id="{8EB89D28-96EC-2EFE-AC89-524B0B698CEA}"/>
+                <a16:creationId xmlns:a16="http://schemas.microsoft.com/office/drawing/2014/main" id="{0D9FDAE6-550E-E975-BD01-08906590C472}"/>
               </a:ext>
             </a:extLst>
           </p:cNvPr>
@@ -22568,38 +23452,19 @@
           <a:lstStyle/>
           <a:p>
             <a:r>
-              <a:rPr lang="en-US" sz="4000" dirty="0">
-                <a:solidFill>
-                  <a:schemeClr val="bg1"/>
-                </a:solidFill>
-              </a:rPr>
-              <a:t>Please take </a:t>
-            </a:r>
-            <a:br>
-              <a:rPr lang="en-US" sz="4000" dirty="0">
-                <a:solidFill>
-                  <a:schemeClr val="bg1"/>
-                </a:solidFill>
-              </a:rPr>
-            </a:br>
-            <a:r>
-              <a:rPr lang="en-US" sz="4000" dirty="0">
-                <a:solidFill>
-                  <a:schemeClr val="bg1"/>
-                </a:solidFill>
-              </a:rPr>
-              <a:t>your survey.</a:t>
-            </a:r>
-            <a:endParaRPr lang="en-US" sz="4000" dirty="0"/>
+              <a:rPr lang="en-US" dirty="0" smtClean="0"/>
+              <a:t>What is a Script?</a:t>
+            </a:r>
+            <a:endParaRPr lang="en-US" dirty="0"/>
           </a:p>
         </p:txBody>
       </p:sp>
       <p:sp>
         <p:nvSpPr>
-          <p:cNvPr id="3" name="Subtitle 2">
+          <p:cNvPr id="5" name="Content Placeholder 4">
             <a:extLst>
               <a:ext uri="{FF2B5EF4-FFF2-40B4-BE49-F238E27FC236}">
-                <a16:creationId xmlns:a16="http://schemas.microsoft.com/office/drawing/2014/main" id="{72AB6EE2-A795-0B32-903A-22365F29631E}"/>
+                <a16:creationId xmlns:a16="http://schemas.microsoft.com/office/drawing/2014/main" id="{8FBEB278-6650-3A11-7DCD-A90016572E5A}"/>
               </a:ext>
             </a:extLst>
           </p:cNvPr>
@@ -22607,7 +23472,7 @@
             <a:spLocks noGrp="1"/>
           </p:cNvSpPr>
           <p:nvPr>
-            <p:ph type="subTitle" idx="10"/>
+            <p:ph sz="quarter" idx="14"/>
           </p:nvPr>
         </p:nvSpPr>
         <p:spPr/>
@@ -22615,93 +23480,26 @@
           <a:bodyPr/>
           <a:lstStyle/>
           <a:p>
+            <a:pPr marL="342900" indent="-342900"/>
+            <a:r>
+              <a:rPr lang="en-US" dirty="0" smtClean="0"/>
+              <a:t>What is a Script?</a:t>
+            </a:r>
+          </a:p>
+          <a:p>
+            <a:pPr marL="342900" indent="-342900"/>
+            <a:endParaRPr lang="en-US" dirty="0" smtClean="0"/>
+          </a:p>
+          <a:p>
+            <a:pPr marL="342900" indent="-342900"/>
             <a:endParaRPr lang="en-US" dirty="0"/>
-          </a:p>
-        </p:txBody>
-      </p:sp>
-      <p:sp>
-        <p:nvSpPr>
-          <p:cNvPr id="4" name="TextBox 3">
-            <a:extLst>
-              <a:ext uri="{FF2B5EF4-FFF2-40B4-BE49-F238E27FC236}">
-                <a16:creationId xmlns:a16="http://schemas.microsoft.com/office/drawing/2014/main" id="{1296680E-15AF-2278-3275-B47338D845B6}"/>
-              </a:ext>
-            </a:extLst>
-          </p:cNvPr>
-          <p:cNvSpPr txBox="1"/>
-          <p:nvPr/>
-        </p:nvSpPr>
-        <p:spPr>
-          <a:xfrm>
-            <a:off x="588494" y="6395860"/>
-            <a:ext cx="3855223" cy="215444"/>
-          </a:xfrm>
-          <a:prstGeom prst="rect">
-            <a:avLst/>
-          </a:prstGeom>
-          <a:noFill/>
-        </p:spPr>
-        <p:txBody>
-          <a:bodyPr wrap="none" lIns="0" tIns="0" rIns="0" bIns="0" rtlCol="0">
-            <a:spAutoFit/>
-          </a:bodyPr>
-          <a:lstStyle/>
-          <a:p>
-            <a:pPr algn="l">
-              <a:lnSpc>
-                <a:spcPct val="100000"/>
-              </a:lnSpc>
-            </a:pPr>
-            <a:r>
-              <a:rPr lang="en-US" sz="700" spc="0" baseline="0" dirty="0">
-                <a:ln/>
-                <a:solidFill>
-                  <a:schemeClr val="bg1"/>
-                </a:solidFill>
-                <a:latin typeface="Metropolis-Regular"/>
-                <a:sym typeface="Metropolis-Regular"/>
-                <a:rtl val="0"/>
-              </a:rPr>
-              <a:t>Broadcom Proprietary and Confidential. Copyright © 2024 Broadcom. </a:t>
-            </a:r>
-          </a:p>
-          <a:p>
-            <a:pPr marL="0" marR="0" lvl="0" indent="0" algn="l" defTabSz="914400" rtl="0" eaLnBrk="1" fontAlgn="auto" latinLnBrk="0" hangingPunct="1">
-              <a:lnSpc>
-                <a:spcPct val="100000"/>
-              </a:lnSpc>
-              <a:spcBef>
-                <a:spcPts val="0"/>
-              </a:spcBef>
-              <a:spcAft>
-                <a:spcPts val="0"/>
-              </a:spcAft>
-              <a:buClrTx/>
-              <a:buSzTx/>
-              <a:buFontTx/>
-              <a:buNone/>
-              <a:tabLst/>
-              <a:defRPr/>
-            </a:pPr>
-            <a:r>
-              <a:rPr lang="en-US" sz="700" spc="0" baseline="0" dirty="0">
-                <a:ln/>
-                <a:solidFill>
-                  <a:schemeClr val="bg1"/>
-                </a:solidFill>
-                <a:latin typeface="Metropolis-Regular"/>
-                <a:sym typeface="Metropolis-Regular"/>
-                <a:rtl val="0"/>
-              </a:rPr>
-              <a:t>All Rights Reserved. The term “Broadcom” refers to Broadcom Inc. and/or its subsidiaries.</a:t>
-            </a:r>
           </a:p>
         </p:txBody>
       </p:sp>
     </p:spTree>
     <p:extLst>
       <p:ext uri="{BB962C8B-B14F-4D97-AF65-F5344CB8AC3E}">
-        <p14:creationId xmlns:p14="http://schemas.microsoft.com/office/powerpoint/2010/main" val="2198077059"/>
+        <p14:creationId xmlns:p14="http://schemas.microsoft.com/office/powerpoint/2010/main" val="235647852"/>
       </p:ext>
     </p:extLst>
   </p:cSld>
@@ -22745,7 +23543,7 @@
           <p:cNvPr id="2" name="Title 1">
             <a:extLst>
               <a:ext uri="{FF2B5EF4-FFF2-40B4-BE49-F238E27FC236}">
-                <a16:creationId xmlns:a16="http://schemas.microsoft.com/office/drawing/2014/main" id="{8EB89D28-96EC-2EFE-AC89-524B0B698CEA}"/>
+                <a16:creationId xmlns:a16="http://schemas.microsoft.com/office/drawing/2014/main" id="{0D9FDAE6-550E-E975-BD01-08906590C472}"/>
               </a:ext>
             </a:extLst>
           </p:cNvPr>
@@ -22756,884 +23554,60 @@
             <p:ph type="title"/>
           </p:nvPr>
         </p:nvSpPr>
-        <p:spPr>
-          <a:xfrm>
-            <a:off x="589108" y="1790119"/>
-            <a:ext cx="5937816" cy="1229360"/>
-          </a:xfrm>
-        </p:spPr>
+        <p:spPr/>
         <p:txBody>
           <a:bodyPr/>
           <a:lstStyle/>
           <a:p>
-            <a:pPr>
-              <a:lnSpc>
-                <a:spcPct val="150000"/>
-              </a:lnSpc>
-            </a:pPr>
-            <a:r>
-              <a:rPr lang="en-US" sz="4000" dirty="0">
-                <a:solidFill>
-                  <a:schemeClr val="bg1"/>
-                </a:solidFill>
-              </a:rPr>
-              <a:t>Stay Connected</a:t>
-            </a:r>
-            <a:br>
-              <a:rPr lang="en-US" sz="4000" dirty="0">
-                <a:solidFill>
-                  <a:schemeClr val="bg1"/>
-                </a:solidFill>
-              </a:rPr>
-            </a:br>
-            <a:r>
-              <a:rPr lang="en-US" sz="2400" dirty="0">
-                <a:solidFill>
-                  <a:schemeClr val="bg1"/>
-                </a:solidFill>
-              </a:rPr>
-              <a:t>Let’s continue the conversation</a:t>
-            </a:r>
-            <a:endParaRPr lang="en-US" sz="4000" dirty="0"/>
+            <a:r>
+              <a:rPr lang="en-US" dirty="0" smtClean="0"/>
+              <a:t>VMware Developer Center</a:t>
+            </a:r>
+            <a:endParaRPr lang="en-US" dirty="0"/>
           </a:p>
         </p:txBody>
       </p:sp>
       <p:sp>
         <p:nvSpPr>
-          <p:cNvPr id="7" name="Subtitle">
+          <p:cNvPr id="5" name="Content Placeholder 4">
             <a:extLst>
               <a:ext uri="{FF2B5EF4-FFF2-40B4-BE49-F238E27FC236}">
-                <a16:creationId xmlns:a16="http://schemas.microsoft.com/office/drawing/2014/main" id="{691992C1-94D7-6F63-24A2-9014ECDA6F67}"/>
+                <a16:creationId xmlns:a16="http://schemas.microsoft.com/office/drawing/2014/main" id="{8FBEB278-6650-3A11-7DCD-A90016572E5A}"/>
               </a:ext>
             </a:extLst>
           </p:cNvPr>
-          <p:cNvSpPr txBox="1">
-            <a:spLocks/>
+          <p:cNvSpPr>
+            <a:spLocks noGrp="1"/>
           </p:cNvSpPr>
-          <p:nvPr/>
+          <p:nvPr>
+            <p:ph sz="quarter" idx="14"/>
+          </p:nvPr>
         </p:nvSpPr>
-        <p:spPr>
-          <a:xfrm>
-            <a:off x="602966" y="3706846"/>
-            <a:ext cx="5937816" cy="700882"/>
-          </a:xfrm>
-          <a:prstGeom prst="rect">
-            <a:avLst/>
-          </a:prstGeom>
-        </p:spPr>
+        <p:spPr/>
         <p:txBody>
-          <a:bodyPr vert="horz" lIns="0" tIns="0" rIns="0" bIns="0" rtlCol="0">
-            <a:noAutofit/>
-          </a:bodyPr>
-          <a:lstStyle>
-            <a:lvl1pPr marL="0" indent="0" algn="l" defTabSz="914400" rtl="0" eaLnBrk="1" latinLnBrk="0" hangingPunct="1">
-              <a:lnSpc>
-                <a:spcPct val="100000"/>
-              </a:lnSpc>
-              <a:spcBef>
-                <a:spcPts val="1200"/>
-              </a:spcBef>
-              <a:buClr>
-                <a:schemeClr val="tx1">
-                  <a:lumMod val="60000"/>
-                  <a:lumOff val="40000"/>
-                </a:schemeClr>
-              </a:buClr>
-              <a:buSzPct val="90000"/>
-              <a:buFont typeface="Arial" panose="020B0604020202020204" pitchFamily="34" charset="0"/>
-              <a:buNone/>
-              <a:defRPr sz="2400" kern="1200">
-                <a:solidFill>
-                  <a:schemeClr val="tx2"/>
-                </a:solidFill>
-                <a:latin typeface="+mj-lt"/>
-                <a:ea typeface="+mn-ea"/>
-                <a:cs typeface="+mn-cs"/>
-              </a:defRPr>
-            </a:lvl1pPr>
-            <a:lvl2pPr marL="457200" indent="0" algn="ctr" defTabSz="914400" rtl="0" eaLnBrk="1" latinLnBrk="0" hangingPunct="1">
-              <a:lnSpc>
-                <a:spcPct val="100000"/>
-              </a:lnSpc>
-              <a:spcBef>
-                <a:spcPts val="1200"/>
-              </a:spcBef>
-              <a:buClr>
-                <a:schemeClr val="tx1"/>
-              </a:buClr>
-              <a:buSzPct val="90000"/>
-              <a:buFont typeface="Arial" panose="020B0604020202020204" pitchFamily="34" charset="0"/>
-              <a:buNone/>
-              <a:defRPr sz="2000" kern="1200">
-                <a:solidFill>
-                  <a:schemeClr val="tx2"/>
-                </a:solidFill>
-                <a:latin typeface="+mn-lt"/>
-                <a:ea typeface="+mn-ea"/>
-                <a:cs typeface="+mn-cs"/>
-              </a:defRPr>
-            </a:lvl2pPr>
-            <a:lvl3pPr marL="914400" indent="0" algn="ctr" defTabSz="914400" rtl="0" eaLnBrk="1" latinLnBrk="0" hangingPunct="1">
-              <a:lnSpc>
-                <a:spcPct val="100000"/>
-              </a:lnSpc>
-              <a:spcBef>
-                <a:spcPts val="1200"/>
-              </a:spcBef>
-              <a:spcAft>
-                <a:spcPts val="0"/>
-              </a:spcAft>
-              <a:buClr>
-                <a:schemeClr val="tx1"/>
-              </a:buClr>
-              <a:buSzPct val="90000"/>
-              <a:buFont typeface="Camphor Std" panose="020B0504030404020204" pitchFamily="34" charset="0"/>
-              <a:buNone/>
-              <a:defRPr sz="1800" kern="1200">
-                <a:solidFill>
-                  <a:schemeClr val="tx2"/>
-                </a:solidFill>
-                <a:latin typeface="+mn-lt"/>
-                <a:ea typeface="+mn-ea"/>
-                <a:cs typeface="+mn-cs"/>
-              </a:defRPr>
-            </a:lvl3pPr>
-            <a:lvl4pPr marL="1371600" indent="0" algn="ctr" defTabSz="914400" rtl="0" eaLnBrk="1" latinLnBrk="0" hangingPunct="1">
-              <a:lnSpc>
-                <a:spcPct val="100000"/>
-              </a:lnSpc>
-              <a:spcBef>
-                <a:spcPts val="1200"/>
-              </a:spcBef>
-              <a:buClr>
-                <a:schemeClr val="tx1"/>
-              </a:buClr>
-              <a:buSzPct val="90000"/>
-              <a:buFont typeface="Arial" panose="020B0604020202020204" pitchFamily="34" charset="0"/>
-              <a:buNone/>
-              <a:defRPr sz="1600" kern="1200">
-                <a:solidFill>
-                  <a:schemeClr val="tx2"/>
-                </a:solidFill>
-                <a:latin typeface="+mn-lt"/>
-                <a:ea typeface="+mn-ea"/>
-                <a:cs typeface="+mn-cs"/>
-              </a:defRPr>
-            </a:lvl4pPr>
-            <a:lvl5pPr marL="1828800" indent="0" algn="ctr" defTabSz="914400" rtl="0" eaLnBrk="1" latinLnBrk="0" hangingPunct="1">
-              <a:lnSpc>
-                <a:spcPct val="100000"/>
-              </a:lnSpc>
-              <a:spcBef>
-                <a:spcPts val="1200"/>
-              </a:spcBef>
-              <a:buClr>
-                <a:schemeClr val="tx1"/>
-              </a:buClr>
-              <a:buSzPct val="90000"/>
-              <a:buFont typeface="Camphor Std" panose="020B0504030404020204" pitchFamily="34" charset="0"/>
-              <a:buNone/>
-              <a:tabLst/>
-              <a:defRPr sz="1600" kern="1200">
-                <a:solidFill>
-                  <a:schemeClr val="tx2"/>
-                </a:solidFill>
-                <a:latin typeface="+mn-lt"/>
-                <a:ea typeface="+mn-ea"/>
-                <a:cs typeface="+mn-cs"/>
-              </a:defRPr>
-            </a:lvl5pPr>
-            <a:lvl6pPr marL="2286000" indent="0" algn="ctr" defTabSz="914400" rtl="0" eaLnBrk="1" latinLnBrk="0" hangingPunct="1">
-              <a:lnSpc>
-                <a:spcPct val="100000"/>
-              </a:lnSpc>
-              <a:spcBef>
-                <a:spcPts val="1200"/>
-              </a:spcBef>
-              <a:buClr>
-                <a:schemeClr val="tx1"/>
-              </a:buClr>
-              <a:buSzPct val="90000"/>
-              <a:buFont typeface="Arial" panose="020B0604020202020204" pitchFamily="34" charset="0"/>
-              <a:buNone/>
-              <a:tabLst/>
-              <a:defRPr sz="1600" kern="1200">
-                <a:solidFill>
-                  <a:schemeClr val="tx2"/>
-                </a:solidFill>
-                <a:latin typeface="+mn-lt"/>
-                <a:ea typeface="+mn-ea"/>
-                <a:cs typeface="+mn-cs"/>
-              </a:defRPr>
-            </a:lvl6pPr>
-            <a:lvl7pPr marL="2743200" indent="0" algn="ctr" defTabSz="914400" rtl="0" eaLnBrk="1" latinLnBrk="0" hangingPunct="1">
-              <a:lnSpc>
-                <a:spcPct val="100000"/>
-              </a:lnSpc>
-              <a:spcBef>
-                <a:spcPts val="1200"/>
-              </a:spcBef>
-              <a:buClr>
-                <a:schemeClr val="tx1"/>
-              </a:buClr>
-              <a:buSzPct val="90000"/>
-              <a:buFont typeface="System Font Regular"/>
-              <a:buNone/>
-              <a:tabLst/>
-              <a:defRPr sz="1600" kern="1200">
-                <a:solidFill>
-                  <a:schemeClr val="tx2"/>
-                </a:solidFill>
-                <a:latin typeface="+mn-lt"/>
-                <a:ea typeface="+mn-ea"/>
-                <a:cs typeface="+mn-cs"/>
-              </a:defRPr>
-            </a:lvl7pPr>
-            <a:lvl8pPr marL="3200400" indent="0" algn="ctr" defTabSz="914400" rtl="0" eaLnBrk="1" latinLnBrk="0" hangingPunct="1">
-              <a:lnSpc>
-                <a:spcPct val="100000"/>
-              </a:lnSpc>
-              <a:spcBef>
-                <a:spcPts val="1200"/>
-              </a:spcBef>
-              <a:buClr>
-                <a:schemeClr val="tx1"/>
-              </a:buClr>
-              <a:buSzPct val="90000"/>
-              <a:buFont typeface="Arial" panose="020B0604020202020204" pitchFamily="34" charset="0"/>
-              <a:buNone/>
-              <a:tabLst/>
-              <a:defRPr sz="1600" kern="1200">
-                <a:solidFill>
-                  <a:schemeClr val="tx2"/>
-                </a:solidFill>
-                <a:latin typeface="+mn-lt"/>
-                <a:ea typeface="+mn-ea"/>
-                <a:cs typeface="+mn-cs"/>
-              </a:defRPr>
-            </a:lvl8pPr>
-            <a:lvl9pPr marL="3657600" indent="0" algn="ctr" defTabSz="914400" rtl="0" eaLnBrk="1" latinLnBrk="0" hangingPunct="1">
-              <a:lnSpc>
-                <a:spcPct val="100000"/>
-              </a:lnSpc>
-              <a:spcBef>
-                <a:spcPts val="1200"/>
-              </a:spcBef>
-              <a:buClr>
-                <a:schemeClr val="tx1"/>
-              </a:buClr>
-              <a:buSzPct val="90000"/>
-              <a:buFont typeface="System Font Regular"/>
-              <a:buNone/>
-              <a:tabLst/>
-              <a:defRPr sz="1600" kern="1200">
-                <a:solidFill>
-                  <a:schemeClr val="tx2"/>
-                </a:solidFill>
-                <a:latin typeface="+mn-lt"/>
-                <a:ea typeface="+mn-ea"/>
-                <a:cs typeface="+mn-cs"/>
-              </a:defRPr>
-            </a:lvl9pPr>
-          </a:lstStyle>
-          <a:p>
-            <a:pPr lvl="0"/>
-            <a:r>
-              <a:rPr lang="en-US" dirty="0">
-                <a:solidFill>
-                  <a:schemeClr val="bg1"/>
-                </a:solidFill>
-              </a:rPr>
-              <a:t>Follow us @</a:t>
-            </a:r>
-          </a:p>
-        </p:txBody>
-      </p:sp>
-      <p:sp>
-        <p:nvSpPr>
-          <p:cNvPr id="8" name="Subtitle">
-            <a:extLst>
-              <a:ext uri="{FF2B5EF4-FFF2-40B4-BE49-F238E27FC236}">
-                <a16:creationId xmlns:a16="http://schemas.microsoft.com/office/drawing/2014/main" id="{AC644614-4D49-5ACC-86D4-DA1DB135B622}"/>
-              </a:ext>
-            </a:extLst>
-          </p:cNvPr>
-          <p:cNvSpPr txBox="1">
-            <a:spLocks/>
-          </p:cNvSpPr>
-          <p:nvPr/>
-        </p:nvSpPr>
-        <p:spPr>
-          <a:xfrm>
-            <a:off x="589108" y="4631993"/>
-            <a:ext cx="5937816" cy="700882"/>
-          </a:xfrm>
-          <a:prstGeom prst="rect">
-            <a:avLst/>
-          </a:prstGeom>
-        </p:spPr>
-        <p:txBody>
-          <a:bodyPr vert="horz" lIns="0" tIns="0" rIns="0" bIns="0" rtlCol="0">
-            <a:noAutofit/>
-          </a:bodyPr>
-          <a:lstStyle>
-            <a:lvl1pPr marL="0" indent="0" algn="l" defTabSz="914400" rtl="0" eaLnBrk="1" latinLnBrk="0" hangingPunct="1">
-              <a:lnSpc>
-                <a:spcPct val="100000"/>
-              </a:lnSpc>
-              <a:spcBef>
-                <a:spcPts val="1200"/>
-              </a:spcBef>
-              <a:buClr>
-                <a:schemeClr val="tx1">
-                  <a:lumMod val="60000"/>
-                  <a:lumOff val="40000"/>
-                </a:schemeClr>
-              </a:buClr>
-              <a:buSzPct val="90000"/>
-              <a:buFont typeface="Arial" panose="020B0604020202020204" pitchFamily="34" charset="0"/>
-              <a:buNone/>
-              <a:defRPr sz="2400" kern="1200">
-                <a:solidFill>
-                  <a:schemeClr val="tx2"/>
-                </a:solidFill>
-                <a:latin typeface="+mj-lt"/>
-                <a:ea typeface="+mn-ea"/>
-                <a:cs typeface="+mn-cs"/>
-              </a:defRPr>
-            </a:lvl1pPr>
-            <a:lvl2pPr marL="457200" indent="0" algn="ctr" defTabSz="914400" rtl="0" eaLnBrk="1" latinLnBrk="0" hangingPunct="1">
-              <a:lnSpc>
-                <a:spcPct val="100000"/>
-              </a:lnSpc>
-              <a:spcBef>
-                <a:spcPts val="1200"/>
-              </a:spcBef>
-              <a:buClr>
-                <a:schemeClr val="tx1"/>
-              </a:buClr>
-              <a:buSzPct val="90000"/>
-              <a:buFont typeface="Arial" panose="020B0604020202020204" pitchFamily="34" charset="0"/>
-              <a:buNone/>
-              <a:defRPr sz="2000" kern="1200">
-                <a:solidFill>
-                  <a:schemeClr val="tx2"/>
-                </a:solidFill>
-                <a:latin typeface="+mn-lt"/>
-                <a:ea typeface="+mn-ea"/>
-                <a:cs typeface="+mn-cs"/>
-              </a:defRPr>
-            </a:lvl2pPr>
-            <a:lvl3pPr marL="914400" indent="0" algn="ctr" defTabSz="914400" rtl="0" eaLnBrk="1" latinLnBrk="0" hangingPunct="1">
-              <a:lnSpc>
-                <a:spcPct val="100000"/>
-              </a:lnSpc>
-              <a:spcBef>
-                <a:spcPts val="1200"/>
-              </a:spcBef>
-              <a:spcAft>
-                <a:spcPts val="0"/>
-              </a:spcAft>
-              <a:buClr>
-                <a:schemeClr val="tx1"/>
-              </a:buClr>
-              <a:buSzPct val="90000"/>
-              <a:buFont typeface="Camphor Std" panose="020B0504030404020204" pitchFamily="34" charset="0"/>
-              <a:buNone/>
-              <a:defRPr sz="1800" kern="1200">
-                <a:solidFill>
-                  <a:schemeClr val="tx2"/>
-                </a:solidFill>
-                <a:latin typeface="+mn-lt"/>
-                <a:ea typeface="+mn-ea"/>
-                <a:cs typeface="+mn-cs"/>
-              </a:defRPr>
-            </a:lvl3pPr>
-            <a:lvl4pPr marL="1371600" indent="0" algn="ctr" defTabSz="914400" rtl="0" eaLnBrk="1" latinLnBrk="0" hangingPunct="1">
-              <a:lnSpc>
-                <a:spcPct val="100000"/>
-              </a:lnSpc>
-              <a:spcBef>
-                <a:spcPts val="1200"/>
-              </a:spcBef>
-              <a:buClr>
-                <a:schemeClr val="tx1"/>
-              </a:buClr>
-              <a:buSzPct val="90000"/>
-              <a:buFont typeface="Arial" panose="020B0604020202020204" pitchFamily="34" charset="0"/>
-              <a:buNone/>
-              <a:defRPr sz="1600" kern="1200">
-                <a:solidFill>
-                  <a:schemeClr val="tx2"/>
-                </a:solidFill>
-                <a:latin typeface="+mn-lt"/>
-                <a:ea typeface="+mn-ea"/>
-                <a:cs typeface="+mn-cs"/>
-              </a:defRPr>
-            </a:lvl4pPr>
-            <a:lvl5pPr marL="1828800" indent="0" algn="ctr" defTabSz="914400" rtl="0" eaLnBrk="1" latinLnBrk="0" hangingPunct="1">
-              <a:lnSpc>
-                <a:spcPct val="100000"/>
-              </a:lnSpc>
-              <a:spcBef>
-                <a:spcPts val="1200"/>
-              </a:spcBef>
-              <a:buClr>
-                <a:schemeClr val="tx1"/>
-              </a:buClr>
-              <a:buSzPct val="90000"/>
-              <a:buFont typeface="Camphor Std" panose="020B0504030404020204" pitchFamily="34" charset="0"/>
-              <a:buNone/>
-              <a:tabLst/>
-              <a:defRPr sz="1600" kern="1200">
-                <a:solidFill>
-                  <a:schemeClr val="tx2"/>
-                </a:solidFill>
-                <a:latin typeface="+mn-lt"/>
-                <a:ea typeface="+mn-ea"/>
-                <a:cs typeface="+mn-cs"/>
-              </a:defRPr>
-            </a:lvl5pPr>
-            <a:lvl6pPr marL="2286000" indent="0" algn="ctr" defTabSz="914400" rtl="0" eaLnBrk="1" latinLnBrk="0" hangingPunct="1">
-              <a:lnSpc>
-                <a:spcPct val="100000"/>
-              </a:lnSpc>
-              <a:spcBef>
-                <a:spcPts val="1200"/>
-              </a:spcBef>
-              <a:buClr>
-                <a:schemeClr val="tx1"/>
-              </a:buClr>
-              <a:buSzPct val="90000"/>
-              <a:buFont typeface="Arial" panose="020B0604020202020204" pitchFamily="34" charset="0"/>
-              <a:buNone/>
-              <a:tabLst/>
-              <a:defRPr sz="1600" kern="1200">
-                <a:solidFill>
-                  <a:schemeClr val="tx2"/>
-                </a:solidFill>
-                <a:latin typeface="+mn-lt"/>
-                <a:ea typeface="+mn-ea"/>
-                <a:cs typeface="+mn-cs"/>
-              </a:defRPr>
-            </a:lvl6pPr>
-            <a:lvl7pPr marL="2743200" indent="0" algn="ctr" defTabSz="914400" rtl="0" eaLnBrk="1" latinLnBrk="0" hangingPunct="1">
-              <a:lnSpc>
-                <a:spcPct val="100000"/>
-              </a:lnSpc>
-              <a:spcBef>
-                <a:spcPts val="1200"/>
-              </a:spcBef>
-              <a:buClr>
-                <a:schemeClr val="tx1"/>
-              </a:buClr>
-              <a:buSzPct val="90000"/>
-              <a:buFont typeface="System Font Regular"/>
-              <a:buNone/>
-              <a:tabLst/>
-              <a:defRPr sz="1600" kern="1200">
-                <a:solidFill>
-                  <a:schemeClr val="tx2"/>
-                </a:solidFill>
-                <a:latin typeface="+mn-lt"/>
-                <a:ea typeface="+mn-ea"/>
-                <a:cs typeface="+mn-cs"/>
-              </a:defRPr>
-            </a:lvl7pPr>
-            <a:lvl8pPr marL="3200400" indent="0" algn="ctr" defTabSz="914400" rtl="0" eaLnBrk="1" latinLnBrk="0" hangingPunct="1">
-              <a:lnSpc>
-                <a:spcPct val="100000"/>
-              </a:lnSpc>
-              <a:spcBef>
-                <a:spcPts val="1200"/>
-              </a:spcBef>
-              <a:buClr>
-                <a:schemeClr val="tx1"/>
-              </a:buClr>
-              <a:buSzPct val="90000"/>
-              <a:buFont typeface="Arial" panose="020B0604020202020204" pitchFamily="34" charset="0"/>
-              <a:buNone/>
-              <a:tabLst/>
-              <a:defRPr sz="1600" kern="1200">
-                <a:solidFill>
-                  <a:schemeClr val="tx2"/>
-                </a:solidFill>
-                <a:latin typeface="+mn-lt"/>
-                <a:ea typeface="+mn-ea"/>
-                <a:cs typeface="+mn-cs"/>
-              </a:defRPr>
-            </a:lvl8pPr>
-            <a:lvl9pPr marL="3657600" indent="0" algn="ctr" defTabSz="914400" rtl="0" eaLnBrk="1" latinLnBrk="0" hangingPunct="1">
-              <a:lnSpc>
-                <a:spcPct val="100000"/>
-              </a:lnSpc>
-              <a:spcBef>
-                <a:spcPts val="1200"/>
-              </a:spcBef>
-              <a:buClr>
-                <a:schemeClr val="tx1"/>
-              </a:buClr>
-              <a:buSzPct val="90000"/>
-              <a:buFont typeface="System Font Regular"/>
-              <a:buNone/>
-              <a:tabLst/>
-              <a:defRPr sz="1600" kern="1200">
-                <a:solidFill>
-                  <a:schemeClr val="tx2"/>
-                </a:solidFill>
-                <a:latin typeface="+mn-lt"/>
-                <a:ea typeface="+mn-ea"/>
-                <a:cs typeface="+mn-cs"/>
-              </a:defRPr>
-            </a:lvl9pPr>
-          </a:lstStyle>
-          <a:p>
-            <a:pPr lvl="0"/>
-            <a:r>
-              <a:rPr lang="en-US" dirty="0">
-                <a:solidFill>
-                  <a:schemeClr val="bg1"/>
-                </a:solidFill>
-              </a:rPr>
-              <a:t>Visit us @</a:t>
-            </a:r>
-          </a:p>
-        </p:txBody>
-      </p:sp>
-      <p:sp>
-        <p:nvSpPr>
-          <p:cNvPr id="9" name="Subtitle">
-            <a:extLst>
-              <a:ext uri="{FF2B5EF4-FFF2-40B4-BE49-F238E27FC236}">
-                <a16:creationId xmlns:a16="http://schemas.microsoft.com/office/drawing/2014/main" id="{D1A7EC52-7EE4-21B7-2494-9B5C987DFCB6}"/>
-              </a:ext>
-            </a:extLst>
-          </p:cNvPr>
-          <p:cNvSpPr txBox="1">
-            <a:spLocks/>
-          </p:cNvSpPr>
-          <p:nvPr/>
-        </p:nvSpPr>
-        <p:spPr>
-          <a:xfrm>
-            <a:off x="589108" y="5534787"/>
-            <a:ext cx="5937816" cy="700882"/>
-          </a:xfrm>
-          <a:prstGeom prst="rect">
-            <a:avLst/>
-          </a:prstGeom>
-        </p:spPr>
-        <p:txBody>
-          <a:bodyPr vert="horz" lIns="0" tIns="0" rIns="0" bIns="0" rtlCol="0">
-            <a:noAutofit/>
-          </a:bodyPr>
-          <a:lstStyle>
-            <a:lvl1pPr marL="0" indent="0" algn="l" defTabSz="914400" rtl="0" eaLnBrk="1" latinLnBrk="0" hangingPunct="1">
-              <a:lnSpc>
-                <a:spcPct val="100000"/>
-              </a:lnSpc>
-              <a:spcBef>
-                <a:spcPts val="1200"/>
-              </a:spcBef>
-              <a:buClr>
-                <a:schemeClr val="tx1">
-                  <a:lumMod val="60000"/>
-                  <a:lumOff val="40000"/>
-                </a:schemeClr>
-              </a:buClr>
-              <a:buSzPct val="90000"/>
-              <a:buFont typeface="Arial" panose="020B0604020202020204" pitchFamily="34" charset="0"/>
-              <a:buNone/>
-              <a:defRPr sz="2400" kern="1200">
-                <a:solidFill>
-                  <a:schemeClr val="tx2"/>
-                </a:solidFill>
-                <a:latin typeface="+mj-lt"/>
-                <a:ea typeface="+mn-ea"/>
-                <a:cs typeface="+mn-cs"/>
-              </a:defRPr>
-            </a:lvl1pPr>
-            <a:lvl2pPr marL="457200" indent="0" algn="ctr" defTabSz="914400" rtl="0" eaLnBrk="1" latinLnBrk="0" hangingPunct="1">
-              <a:lnSpc>
-                <a:spcPct val="100000"/>
-              </a:lnSpc>
-              <a:spcBef>
-                <a:spcPts val="1200"/>
-              </a:spcBef>
-              <a:buClr>
-                <a:schemeClr val="tx1"/>
-              </a:buClr>
-              <a:buSzPct val="90000"/>
-              <a:buFont typeface="Arial" panose="020B0604020202020204" pitchFamily="34" charset="0"/>
-              <a:buNone/>
-              <a:defRPr sz="2000" kern="1200">
-                <a:solidFill>
-                  <a:schemeClr val="tx2"/>
-                </a:solidFill>
-                <a:latin typeface="+mn-lt"/>
-                <a:ea typeface="+mn-ea"/>
-                <a:cs typeface="+mn-cs"/>
-              </a:defRPr>
-            </a:lvl2pPr>
-            <a:lvl3pPr marL="914400" indent="0" algn="ctr" defTabSz="914400" rtl="0" eaLnBrk="1" latinLnBrk="0" hangingPunct="1">
-              <a:lnSpc>
-                <a:spcPct val="100000"/>
-              </a:lnSpc>
-              <a:spcBef>
-                <a:spcPts val="1200"/>
-              </a:spcBef>
-              <a:spcAft>
-                <a:spcPts val="0"/>
-              </a:spcAft>
-              <a:buClr>
-                <a:schemeClr val="tx1"/>
-              </a:buClr>
-              <a:buSzPct val="90000"/>
-              <a:buFont typeface="Camphor Std" panose="020B0504030404020204" pitchFamily="34" charset="0"/>
-              <a:buNone/>
-              <a:defRPr sz="1800" kern="1200">
-                <a:solidFill>
-                  <a:schemeClr val="tx2"/>
-                </a:solidFill>
-                <a:latin typeface="+mn-lt"/>
-                <a:ea typeface="+mn-ea"/>
-                <a:cs typeface="+mn-cs"/>
-              </a:defRPr>
-            </a:lvl3pPr>
-            <a:lvl4pPr marL="1371600" indent="0" algn="ctr" defTabSz="914400" rtl="0" eaLnBrk="1" latinLnBrk="0" hangingPunct="1">
-              <a:lnSpc>
-                <a:spcPct val="100000"/>
-              </a:lnSpc>
-              <a:spcBef>
-                <a:spcPts val="1200"/>
-              </a:spcBef>
-              <a:buClr>
-                <a:schemeClr val="tx1"/>
-              </a:buClr>
-              <a:buSzPct val="90000"/>
-              <a:buFont typeface="Arial" panose="020B0604020202020204" pitchFamily="34" charset="0"/>
-              <a:buNone/>
-              <a:defRPr sz="1600" kern="1200">
-                <a:solidFill>
-                  <a:schemeClr val="tx2"/>
-                </a:solidFill>
-                <a:latin typeface="+mn-lt"/>
-                <a:ea typeface="+mn-ea"/>
-                <a:cs typeface="+mn-cs"/>
-              </a:defRPr>
-            </a:lvl4pPr>
-            <a:lvl5pPr marL="1828800" indent="0" algn="ctr" defTabSz="914400" rtl="0" eaLnBrk="1" latinLnBrk="0" hangingPunct="1">
-              <a:lnSpc>
-                <a:spcPct val="100000"/>
-              </a:lnSpc>
-              <a:spcBef>
-                <a:spcPts val="1200"/>
-              </a:spcBef>
-              <a:buClr>
-                <a:schemeClr val="tx1"/>
-              </a:buClr>
-              <a:buSzPct val="90000"/>
-              <a:buFont typeface="Camphor Std" panose="020B0504030404020204" pitchFamily="34" charset="0"/>
-              <a:buNone/>
-              <a:tabLst/>
-              <a:defRPr sz="1600" kern="1200">
-                <a:solidFill>
-                  <a:schemeClr val="tx2"/>
-                </a:solidFill>
-                <a:latin typeface="+mn-lt"/>
-                <a:ea typeface="+mn-ea"/>
-                <a:cs typeface="+mn-cs"/>
-              </a:defRPr>
-            </a:lvl5pPr>
-            <a:lvl6pPr marL="2286000" indent="0" algn="ctr" defTabSz="914400" rtl="0" eaLnBrk="1" latinLnBrk="0" hangingPunct="1">
-              <a:lnSpc>
-                <a:spcPct val="100000"/>
-              </a:lnSpc>
-              <a:spcBef>
-                <a:spcPts val="1200"/>
-              </a:spcBef>
-              <a:buClr>
-                <a:schemeClr val="tx1"/>
-              </a:buClr>
-              <a:buSzPct val="90000"/>
-              <a:buFont typeface="Arial" panose="020B0604020202020204" pitchFamily="34" charset="0"/>
-              <a:buNone/>
-              <a:tabLst/>
-              <a:defRPr sz="1600" kern="1200">
-                <a:solidFill>
-                  <a:schemeClr val="tx2"/>
-                </a:solidFill>
-                <a:latin typeface="+mn-lt"/>
-                <a:ea typeface="+mn-ea"/>
-                <a:cs typeface="+mn-cs"/>
-              </a:defRPr>
-            </a:lvl6pPr>
-            <a:lvl7pPr marL="2743200" indent="0" algn="ctr" defTabSz="914400" rtl="0" eaLnBrk="1" latinLnBrk="0" hangingPunct="1">
-              <a:lnSpc>
-                <a:spcPct val="100000"/>
-              </a:lnSpc>
-              <a:spcBef>
-                <a:spcPts val="1200"/>
-              </a:spcBef>
-              <a:buClr>
-                <a:schemeClr val="tx1"/>
-              </a:buClr>
-              <a:buSzPct val="90000"/>
-              <a:buFont typeface="System Font Regular"/>
-              <a:buNone/>
-              <a:tabLst/>
-              <a:defRPr sz="1600" kern="1200">
-                <a:solidFill>
-                  <a:schemeClr val="tx2"/>
-                </a:solidFill>
-                <a:latin typeface="+mn-lt"/>
-                <a:ea typeface="+mn-ea"/>
-                <a:cs typeface="+mn-cs"/>
-              </a:defRPr>
-            </a:lvl7pPr>
-            <a:lvl8pPr marL="3200400" indent="0" algn="ctr" defTabSz="914400" rtl="0" eaLnBrk="1" latinLnBrk="0" hangingPunct="1">
-              <a:lnSpc>
-                <a:spcPct val="100000"/>
-              </a:lnSpc>
-              <a:spcBef>
-                <a:spcPts val="1200"/>
-              </a:spcBef>
-              <a:buClr>
-                <a:schemeClr val="tx1"/>
-              </a:buClr>
-              <a:buSzPct val="90000"/>
-              <a:buFont typeface="Arial" panose="020B0604020202020204" pitchFamily="34" charset="0"/>
-              <a:buNone/>
-              <a:tabLst/>
-              <a:defRPr sz="1600" kern="1200">
-                <a:solidFill>
-                  <a:schemeClr val="tx2"/>
-                </a:solidFill>
-                <a:latin typeface="+mn-lt"/>
-                <a:ea typeface="+mn-ea"/>
-                <a:cs typeface="+mn-cs"/>
-              </a:defRPr>
-            </a:lvl8pPr>
-            <a:lvl9pPr marL="3657600" indent="0" algn="ctr" defTabSz="914400" rtl="0" eaLnBrk="1" latinLnBrk="0" hangingPunct="1">
-              <a:lnSpc>
-                <a:spcPct val="100000"/>
-              </a:lnSpc>
-              <a:spcBef>
-                <a:spcPts val="1200"/>
-              </a:spcBef>
-              <a:buClr>
-                <a:schemeClr val="tx1"/>
-              </a:buClr>
-              <a:buSzPct val="90000"/>
-              <a:buFont typeface="System Font Regular"/>
-              <a:buNone/>
-              <a:tabLst/>
-              <a:defRPr sz="1600" kern="1200">
-                <a:solidFill>
-                  <a:schemeClr val="tx2"/>
-                </a:solidFill>
-                <a:latin typeface="+mn-lt"/>
-                <a:ea typeface="+mn-ea"/>
-                <a:cs typeface="+mn-cs"/>
-              </a:defRPr>
-            </a:lvl9pPr>
-          </a:lstStyle>
-          <a:p>
-            <a:pPr lvl="0"/>
-            <a:r>
-              <a:rPr lang="en-US" dirty="0">
-                <a:solidFill>
-                  <a:schemeClr val="bg1"/>
-                </a:solidFill>
-              </a:rPr>
-              <a:t>Dig deeper with </a:t>
-            </a:r>
-          </a:p>
-        </p:txBody>
-      </p:sp>
-      <p:sp>
-        <p:nvSpPr>
-          <p:cNvPr id="3" name="TextBox 2">
-            <a:extLst>
-              <a:ext uri="{FF2B5EF4-FFF2-40B4-BE49-F238E27FC236}">
-                <a16:creationId xmlns:a16="http://schemas.microsoft.com/office/drawing/2014/main" id="{A15D6AEA-5157-ADE8-76A5-8507CE788903}"/>
-              </a:ext>
-            </a:extLst>
-          </p:cNvPr>
-          <p:cNvSpPr txBox="1"/>
-          <p:nvPr/>
-        </p:nvSpPr>
-        <p:spPr>
-          <a:xfrm>
-            <a:off x="588494" y="6395860"/>
-            <a:ext cx="3855223" cy="215444"/>
-          </a:xfrm>
-          <a:prstGeom prst="rect">
-            <a:avLst/>
-          </a:prstGeom>
-          <a:noFill/>
-        </p:spPr>
-        <p:txBody>
-          <a:bodyPr wrap="none" lIns="0" tIns="0" rIns="0" bIns="0" rtlCol="0">
-            <a:spAutoFit/>
-          </a:bodyPr>
+          <a:bodyPr/>
           <a:lstStyle/>
           <a:p>
-            <a:pPr algn="l">
-              <a:lnSpc>
-                <a:spcPct val="100000"/>
-              </a:lnSpc>
-            </a:pPr>
-            <a:r>
-              <a:rPr lang="en-US" sz="700" spc="0" baseline="0" dirty="0">
-                <a:ln/>
-                <a:solidFill>
-                  <a:schemeClr val="bg1"/>
-                </a:solidFill>
-                <a:latin typeface="Metropolis-Regular"/>
-                <a:sym typeface="Metropolis-Regular"/>
-                <a:rtl val="0"/>
-              </a:rPr>
-              <a:t>Broadcom Proprietary and Confidential. Copyright © 2024 Broadcom. </a:t>
-            </a:r>
-          </a:p>
-          <a:p>
-            <a:pPr marL="0" marR="0" lvl="0" indent="0" algn="l" defTabSz="914400" rtl="0" eaLnBrk="1" fontAlgn="auto" latinLnBrk="0" hangingPunct="1">
-              <a:lnSpc>
-                <a:spcPct val="100000"/>
-              </a:lnSpc>
-              <a:spcBef>
-                <a:spcPts val="0"/>
-              </a:spcBef>
-              <a:spcAft>
-                <a:spcPts val="0"/>
-              </a:spcAft>
-              <a:buClrTx/>
-              <a:buSzTx/>
-              <a:buFontTx/>
-              <a:buNone/>
-              <a:tabLst/>
-              <a:defRPr/>
-            </a:pPr>
-            <a:r>
-              <a:rPr lang="en-US" sz="700" spc="0" baseline="0" dirty="0">
-                <a:ln/>
-                <a:solidFill>
-                  <a:schemeClr val="bg1"/>
-                </a:solidFill>
-                <a:latin typeface="Metropolis-Regular"/>
-                <a:sym typeface="Metropolis-Regular"/>
-                <a:rtl val="0"/>
-              </a:rPr>
-              <a:t>All Rights Reserved. The term “Broadcom” refers to Broadcom Inc. and/or its subsidiaries.</a:t>
-            </a:r>
+            <a:pPr marL="342900" indent="-342900"/>
+            <a:r>
+              <a:rPr lang="en-US" dirty="0" smtClean="0"/>
+              <a:t>VMware Developer Center</a:t>
+            </a:r>
+          </a:p>
+          <a:p>
+            <a:pPr marL="342900" indent="-342900"/>
+            <a:endParaRPr lang="en-US" dirty="0" smtClean="0"/>
+          </a:p>
+          <a:p>
+            <a:pPr marL="342900" indent="-342900"/>
+            <a:endParaRPr lang="en-US" dirty="0"/>
           </a:p>
         </p:txBody>
       </p:sp>
     </p:spTree>
     <p:extLst>
       <p:ext uri="{BB962C8B-B14F-4D97-AF65-F5344CB8AC3E}">
-        <p14:creationId xmlns:p14="http://schemas.microsoft.com/office/powerpoint/2010/main" val="2186636965"/>
+        <p14:creationId xmlns:p14="http://schemas.microsoft.com/office/powerpoint/2010/main" val="2568143770"/>
       </p:ext>
     </p:extLst>
   </p:cSld>
@@ -24567,26 +24541,12 @@
 </file>
 
 <file path=customXml/item1.xml><?xml version="1.0" encoding="utf-8"?>
-<p:properties xmlns:p="http://schemas.microsoft.com/office/2006/metadata/properties" xmlns:xsi="http://www.w3.org/2001/XMLSchema-instance" xmlns:pc="http://schemas.microsoft.com/office/infopath/2007/PartnerControls">
-  <documentManagement>
-    <lcf76f155ced4ddcb4097134ff3c332f xmlns="34d4d772-b3f2-47fc-9a2d-2126f9957ae8">
-      <Terms xmlns="http://schemas.microsoft.com/office/infopath/2007/PartnerControls"/>
-    </lcf76f155ced4ddcb4097134ff3c332f>
-    <TaxCatchAll xmlns="d345b56e-75a0-4ca8-9b4b-110cb999efd5" xsi:nil="true"/>
-    <SharedWithUsers xmlns="d345b56e-75a0-4ca8-9b4b-110cb999efd5">
-      <UserInfo>
-        <DisplayName>Juanly Cabrera</DisplayName>
-        <AccountId>17</AccountId>
-        <AccountType/>
-      </UserInfo>
-      <UserInfo>
-        <DisplayName>Andre Fernandes</DisplayName>
-        <AccountId>20</AccountId>
-        <AccountType/>
-      </UserInfo>
-    </SharedWithUsers>
-  </documentManagement>
-</p:properties>
+<?mso-contentType ?>
+<FormTemplates xmlns="http://schemas.microsoft.com/sharepoint/v3/contenttype/forms">
+  <Display>DocumentLibraryForm</Display>
+  <Edit>DocumentLibraryForm</Edit>
+  <New>DocumentLibraryForm</New>
+</FormTemplates>
 </file>
 
 <file path=customXml/item2.xml><?xml version="1.0" encoding="utf-8"?>
@@ -24825,27 +24785,32 @@
 </file>
 
 <file path=customXml/item3.xml><?xml version="1.0" encoding="utf-8"?>
-<?mso-contentType ?>
-<FormTemplates xmlns="http://schemas.microsoft.com/sharepoint/v3/contenttype/forms">
-  <Display>DocumentLibraryForm</Display>
-  <Edit>DocumentLibraryForm</Edit>
-  <New>DocumentLibraryForm</New>
-</FormTemplates>
+<p:properties xmlns:p="http://schemas.microsoft.com/office/2006/metadata/properties" xmlns:xsi="http://www.w3.org/2001/XMLSchema-instance" xmlns:pc="http://schemas.microsoft.com/office/infopath/2007/PartnerControls">
+  <documentManagement>
+    <lcf76f155ced4ddcb4097134ff3c332f xmlns="34d4d772-b3f2-47fc-9a2d-2126f9957ae8">
+      <Terms xmlns="http://schemas.microsoft.com/office/infopath/2007/PartnerControls"/>
+    </lcf76f155ced4ddcb4097134ff3c332f>
+    <TaxCatchAll xmlns="d345b56e-75a0-4ca8-9b4b-110cb999efd5" xsi:nil="true"/>
+    <SharedWithUsers xmlns="d345b56e-75a0-4ca8-9b4b-110cb999efd5">
+      <UserInfo>
+        <DisplayName>Juanly Cabrera</DisplayName>
+        <AccountId>17</AccountId>
+        <AccountType/>
+      </UserInfo>
+      <UserInfo>
+        <DisplayName>Andre Fernandes</DisplayName>
+        <AccountId>20</AccountId>
+        <AccountType/>
+      </UserInfo>
+    </SharedWithUsers>
+  </documentManagement>
+</p:properties>
 </file>
 
 <file path=customXml/itemProps1.xml><?xml version="1.0" encoding="utf-8"?>
-<ds:datastoreItem xmlns:ds="http://schemas.openxmlformats.org/officeDocument/2006/customXml" ds:itemID="{51634573-F7D8-4ECC-B5FF-91D1E5D2E650}">
+<ds:datastoreItem xmlns:ds="http://schemas.openxmlformats.org/officeDocument/2006/customXml" ds:itemID="{BAD99180-4DF7-4231-B572-5E5D5B192DA4}">
   <ds:schemaRefs>
-    <ds:schemaRef ds:uri="34d4d772-b3f2-47fc-9a2d-2126f9957ae8"/>
-    <ds:schemaRef ds:uri="d345b56e-75a0-4ca8-9b4b-110cb999efd5"/>
-    <ds:schemaRef ds:uri="http://purl.org/dc/dcmitype/"/>
-    <ds:schemaRef ds:uri="http://purl.org/dc/elements/1.1/"/>
-    <ds:schemaRef ds:uri="http://purl.org/dc/terms/"/>
-    <ds:schemaRef ds:uri="http://schemas.microsoft.com/office/2006/documentManagement/types"/>
-    <ds:schemaRef ds:uri="http://schemas.microsoft.com/office/2006/metadata/properties"/>
-    <ds:schemaRef ds:uri="http://schemas.microsoft.com/office/infopath/2007/PartnerControls"/>
-    <ds:schemaRef ds:uri="http://schemas.openxmlformats.org/package/2006/metadata/core-properties"/>
-    <ds:schemaRef ds:uri="http://www.w3.org/XML/1998/namespace"/>
+    <ds:schemaRef ds:uri="http://schemas.microsoft.com/sharepoint/v3/contenttype/forms"/>
   </ds:schemaRefs>
 </ds:datastoreItem>
 </file>
@@ -24870,9 +24835,18 @@
 </file>
 
 <file path=customXml/itemProps3.xml><?xml version="1.0" encoding="utf-8"?>
-<ds:datastoreItem xmlns:ds="http://schemas.openxmlformats.org/officeDocument/2006/customXml" ds:itemID="{BAD99180-4DF7-4231-B572-5E5D5B192DA4}">
+<ds:datastoreItem xmlns:ds="http://schemas.openxmlformats.org/officeDocument/2006/customXml" ds:itemID="{51634573-F7D8-4ECC-B5FF-91D1E5D2E650}">
   <ds:schemaRefs>
-    <ds:schemaRef ds:uri="http://schemas.microsoft.com/sharepoint/v3/contenttype/forms"/>
+    <ds:schemaRef ds:uri="34d4d772-b3f2-47fc-9a2d-2126f9957ae8"/>
+    <ds:schemaRef ds:uri="d345b56e-75a0-4ca8-9b4b-110cb999efd5"/>
+    <ds:schemaRef ds:uri="http://purl.org/dc/dcmitype/"/>
+    <ds:schemaRef ds:uri="http://purl.org/dc/elements/1.1/"/>
+    <ds:schemaRef ds:uri="http://purl.org/dc/terms/"/>
+    <ds:schemaRef ds:uri="http://schemas.microsoft.com/office/2006/documentManagement/types"/>
+    <ds:schemaRef ds:uri="http://schemas.microsoft.com/office/2006/metadata/properties"/>
+    <ds:schemaRef ds:uri="http://schemas.microsoft.com/office/infopath/2007/PartnerControls"/>
+    <ds:schemaRef ds:uri="http://schemas.openxmlformats.org/package/2006/metadata/core-properties"/>
+    <ds:schemaRef ds:uri="http://www.w3.org/XML/1998/namespace"/>
   </ds:schemaRefs>
 </ds:datastoreItem>
 </file>
</xml_diff>